<commit_message>
got the outline in the powerpoint
</commit_message>
<xml_diff>
--- a/getting-started-with-github-actions.pptx
+++ b/getting-started-with-github-actions.pptx
@@ -6,7 +6,30 @@
   </p:sldMasterIdLst>
   <p:sldIdLst>
     <p:sldId id="256" r:id="rId2"/>
-    <p:sldId id="257" r:id="rId3"/>
+    <p:sldId id="259" r:id="rId3"/>
+    <p:sldId id="260" r:id="rId4"/>
+    <p:sldId id="261" r:id="rId5"/>
+    <p:sldId id="262" r:id="rId6"/>
+    <p:sldId id="263" r:id="rId7"/>
+    <p:sldId id="264" r:id="rId8"/>
+    <p:sldId id="265" r:id="rId9"/>
+    <p:sldId id="266" r:id="rId10"/>
+    <p:sldId id="267" r:id="rId11"/>
+    <p:sldId id="268" r:id="rId12"/>
+    <p:sldId id="269" r:id="rId13"/>
+    <p:sldId id="270" r:id="rId14"/>
+    <p:sldId id="273" r:id="rId15"/>
+    <p:sldId id="272" r:id="rId16"/>
+    <p:sldId id="271" r:id="rId17"/>
+    <p:sldId id="274" r:id="rId18"/>
+    <p:sldId id="275" r:id="rId19"/>
+    <p:sldId id="276" r:id="rId20"/>
+    <p:sldId id="277" r:id="rId21"/>
+    <p:sldId id="278" r:id="rId22"/>
+    <p:sldId id="279" r:id="rId23"/>
+    <p:sldId id="280" r:id="rId24"/>
+    <p:sldId id="281" r:id="rId25"/>
+    <p:sldId id="258" r:id="rId26"/>
   </p:sldIdLst>
   <p:sldSz cx="12192000" cy="6858000"/>
   <p:notesSz cx="6858000" cy="9144000"/>
@@ -105,6 +128,11 @@
       </a:defRPr>
     </a:lvl9pPr>
   </p:defaultTextStyle>
+  <p:extLst>
+    <p:ext uri="{EFAFB233-063F-42B5-8137-9DF3F51BA10A}">
+      <p15:sldGuideLst xmlns:p15="http://schemas.microsoft.com/office/powerpoint/2012/main"/>
+    </p:ext>
+  </p:extLst>
 </p:presentation>
 </file>
 
@@ -456,7 +484,7 @@
           <a:p>
             <a:fld id="{3CADBD16-5BFB-4D9F-9646-C75D1B53BBB6}" type="datetimeFigureOut">
               <a:rPr lang="en-US" smtClean="0"/>
-              <a:t>7/10/2022</a:t>
+              <a:t>5/6/2023</a:t>
             </a:fld>
             <a:endParaRPr lang="en-US"/>
           </a:p>
@@ -697,7 +725,7 @@
           <a:p>
             <a:fld id="{3CADBD16-5BFB-4D9F-9646-C75D1B53BBB6}" type="datetimeFigureOut">
               <a:rPr lang="en-US" smtClean="0"/>
-              <a:t>7/10/2022</a:t>
+              <a:t>5/6/2023</a:t>
             </a:fld>
             <a:endParaRPr lang="en-US"/>
           </a:p>
@@ -905,7 +933,7 @@
           <a:p>
             <a:fld id="{3CADBD16-5BFB-4D9F-9646-C75D1B53BBB6}" type="datetimeFigureOut">
               <a:rPr lang="en-US" smtClean="0"/>
-              <a:t>7/10/2022</a:t>
+              <a:t>5/6/2023</a:t>
             </a:fld>
             <a:endParaRPr lang="en-US"/>
           </a:p>
@@ -1103,7 +1131,7 @@
           <a:p>
             <a:fld id="{3CADBD16-5BFB-4D9F-9646-C75D1B53BBB6}" type="datetimeFigureOut">
               <a:rPr lang="en-US" smtClean="0"/>
-              <a:t>7/10/2022</a:t>
+              <a:t>5/6/2023</a:t>
             </a:fld>
             <a:endParaRPr lang="en-US"/>
           </a:p>
@@ -1380,7 +1408,7 @@
           <a:p>
             <a:fld id="{3CADBD16-5BFB-4D9F-9646-C75D1B53BBB6}" type="datetimeFigureOut">
               <a:rPr lang="en-US" smtClean="0"/>
-              <a:t>7/10/2022</a:t>
+              <a:t>5/6/2023</a:t>
             </a:fld>
             <a:endParaRPr lang="en-US"/>
           </a:p>
@@ -1645,7 +1673,7 @@
           <a:p>
             <a:fld id="{3CADBD16-5BFB-4D9F-9646-C75D1B53BBB6}" type="datetimeFigureOut">
               <a:rPr lang="en-US" smtClean="0"/>
-              <a:t>7/10/2022</a:t>
+              <a:t>5/6/2023</a:t>
             </a:fld>
             <a:endParaRPr lang="en-US"/>
           </a:p>
@@ -2061,7 +2089,7 @@
           <a:p>
             <a:fld id="{3CADBD16-5BFB-4D9F-9646-C75D1B53BBB6}" type="datetimeFigureOut">
               <a:rPr lang="en-US" smtClean="0"/>
-              <a:t>7/10/2022</a:t>
+              <a:t>5/6/2023</a:t>
             </a:fld>
             <a:endParaRPr lang="en-US"/>
           </a:p>
@@ -2211,7 +2239,7 @@
           <a:p>
             <a:fld id="{3CADBD16-5BFB-4D9F-9646-C75D1B53BBB6}" type="datetimeFigureOut">
               <a:rPr lang="en-US" smtClean="0"/>
-              <a:t>7/10/2022</a:t>
+              <a:t>5/6/2023</a:t>
             </a:fld>
             <a:endParaRPr lang="en-US"/>
           </a:p>
@@ -2324,7 +2352,7 @@
           <a:p>
             <a:fld id="{3CADBD16-5BFB-4D9F-9646-C75D1B53BBB6}" type="datetimeFigureOut">
               <a:rPr lang="en-US" smtClean="0"/>
-              <a:t>7/10/2022</a:t>
+              <a:t>5/6/2023</a:t>
             </a:fld>
             <a:endParaRPr lang="en-US"/>
           </a:p>
@@ -2640,7 +2668,7 @@
           <a:p>
             <a:fld id="{3CADBD16-5BFB-4D9F-9646-C75D1B53BBB6}" type="datetimeFigureOut">
               <a:rPr lang="en-US" smtClean="0"/>
-              <a:t>7/10/2022</a:t>
+              <a:t>5/6/2023</a:t>
             </a:fld>
             <a:endParaRPr lang="en-US"/>
           </a:p>
@@ -2891,7 +2919,7 @@
           <a:p>
             <a:fld id="{3CADBD16-5BFB-4D9F-9646-C75D1B53BBB6}" type="datetimeFigureOut">
               <a:rPr lang="en-US" smtClean="0"/>
-              <a:t>7/10/2022</a:t>
+              <a:t>5/6/2023</a:t>
             </a:fld>
             <a:endParaRPr lang="en-US"/>
           </a:p>
@@ -3400,7 +3428,7 @@
             <a:fld id="{3CADBD16-5BFB-4D9F-9646-C75D1B53BBB6}" type="datetimeFigureOut">
               <a:rPr lang="en-US" smtClean="0"/>
               <a:pPr/>
-              <a:t>7/10/2022</a:t>
+              <a:t>5/6/2023</a:t>
             </a:fld>
             <a:endParaRPr lang="en-US" dirty="0"/>
           </a:p>
@@ -3824,10 +3852,10 @@
       </p:grpSpPr>
       <p:sp useBgFill="1">
         <p:nvSpPr>
-          <p:cNvPr id="28" name="Rectangle 8">
-            <a:extLst>
-              <a:ext uri="{FF2B5EF4-FFF2-40B4-BE49-F238E27FC236}">
-                <a16:creationId xmlns:a16="http://schemas.microsoft.com/office/drawing/2014/main" id="{C3B0A228-9EA3-4009-A82E-9402BBC726A0}"/>
+          <p:cNvPr id="35" name="Rectangle 34">
+            <a:extLst>
+              <a:ext uri="{FF2B5EF4-FFF2-40B4-BE49-F238E27FC236}">
+                <a16:creationId xmlns:a16="http://schemas.microsoft.com/office/drawing/2014/main" id="{6D1F4DC3-EDAB-401A-BD21-33D25AB5FD4B}"/>
               </a:ext>
               <a:ext uri="{C183D7F6-B498-43B3-948B-1728B52AA6E4}">
                 <adec:decorative xmlns:adec="http://schemas.microsoft.com/office/drawing/2017/decorative" val="1"/>
@@ -3898,78 +3926,6 @@
           </a:p>
         </p:txBody>
       </p:sp>
-      <p:sp>
-        <p:nvSpPr>
-          <p:cNvPr id="2" name="Title 1">
-            <a:extLst>
-              <a:ext uri="{FF2B5EF4-FFF2-40B4-BE49-F238E27FC236}">
-                <a16:creationId xmlns:a16="http://schemas.microsoft.com/office/drawing/2014/main" id="{581860CC-17F0-0903-F4A8-DC8061CEC54D}"/>
-              </a:ext>
-            </a:extLst>
-          </p:cNvPr>
-          <p:cNvSpPr>
-            <a:spLocks noGrp="1"/>
-          </p:cNvSpPr>
-          <p:nvPr>
-            <p:ph type="ctrTitle"/>
-          </p:nvPr>
-        </p:nvSpPr>
-        <p:spPr>
-          <a:xfrm>
-            <a:off x="1143001" y="1181101"/>
-            <a:ext cx="4953000" cy="2481974"/>
-          </a:xfrm>
-        </p:spPr>
-        <p:txBody>
-          <a:bodyPr>
-            <a:normAutofit/>
-          </a:bodyPr>
-          <a:lstStyle/>
-          <a:p>
-            <a:pPr>
-              <a:lnSpc>
-                <a:spcPct val="90000"/>
-              </a:lnSpc>
-            </a:pPr>
-            <a:r>
-              <a:rPr lang="en-US" sz="4100"/>
-              <a:t>Getting Started with GitHub Actions</a:t>
-            </a:r>
-          </a:p>
-        </p:txBody>
-      </p:sp>
-      <p:sp>
-        <p:nvSpPr>
-          <p:cNvPr id="3" name="Subtitle 2">
-            <a:extLst>
-              <a:ext uri="{FF2B5EF4-FFF2-40B4-BE49-F238E27FC236}">
-                <a16:creationId xmlns:a16="http://schemas.microsoft.com/office/drawing/2014/main" id="{64E78011-366F-5481-85AC-329EED43DEB3}"/>
-              </a:ext>
-            </a:extLst>
-          </p:cNvPr>
-          <p:cNvSpPr>
-            <a:spLocks noGrp="1"/>
-          </p:cNvSpPr>
-          <p:nvPr>
-            <p:ph type="subTitle" idx="1"/>
-          </p:nvPr>
-        </p:nvSpPr>
-        <p:spPr>
-          <a:xfrm>
-            <a:off x="1143001" y="4360719"/>
-            <a:ext cx="2679356" cy="1465118"/>
-          </a:xfrm>
-        </p:spPr>
-        <p:txBody>
-          <a:bodyPr anchor="b">
-            <a:normAutofit/>
-          </a:bodyPr>
-          <a:lstStyle/>
-          <a:p>
-            <a:endParaRPr lang="en-US"/>
-          </a:p>
-        </p:txBody>
-      </p:sp>
       <p:pic>
         <p:nvPicPr>
           <p:cNvPr id="29" name="Picture 3" descr="Background pattern, scatter chart&#10;&#10;Description automatically generated">
@@ -3986,62 +3942,25 @@
         </p:nvPicPr>
         <p:blipFill rotWithShape="1">
           <a:blip r:embed="rId2"/>
-          <a:srcRect l="3670" r="7770" b="-1"/>
+          <a:srcRect t="5828" b="9903"/>
           <a:stretch/>
         </p:blipFill>
         <p:spPr>
           <a:xfrm>
-            <a:off x="3093268" y="10"/>
-            <a:ext cx="9098732" cy="6857990"/>
+            <a:off x="-1" y="10"/>
+            <a:ext cx="12192002" cy="6857989"/>
           </a:xfrm>
-          <a:custGeom>
+          <a:prstGeom prst="rect">
             <a:avLst/>
-            <a:gdLst/>
-            <a:ahLst/>
-            <a:cxnLst/>
-            <a:rect l="l" t="t" r="r" b="b"/>
-            <a:pathLst>
-              <a:path w="9098732" h="6858000">
-                <a:moveTo>
-                  <a:pt x="6010592" y="0"/>
-                </a:moveTo>
-                <a:lnTo>
-                  <a:pt x="8235629" y="4"/>
-                </a:lnTo>
-                <a:cubicBezTo>
-                  <a:pt x="8235629" y="3"/>
-                  <a:pt x="8235630" y="3"/>
-                  <a:pt x="8235630" y="2"/>
-                </a:cubicBezTo>
-                <a:lnTo>
-                  <a:pt x="9098732" y="0"/>
-                </a:lnTo>
-                <a:lnTo>
-                  <a:pt x="9098732" y="6858000"/>
-                </a:lnTo>
-                <a:lnTo>
-                  <a:pt x="0" y="6858000"/>
-                </a:lnTo>
-                <a:lnTo>
-                  <a:pt x="6010589" y="4"/>
-                </a:lnTo>
-                <a:cubicBezTo>
-                  <a:pt x="6010589" y="3"/>
-                  <a:pt x="6010590" y="3"/>
-                  <a:pt x="6010590" y="2"/>
-                </a:cubicBezTo>
-                <a:close/>
-              </a:path>
-            </a:pathLst>
-          </a:custGeom>
+          </a:prstGeom>
         </p:spPr>
       </p:pic>
       <p:sp>
         <p:nvSpPr>
-          <p:cNvPr id="30" name="Freeform: Shape 10">
-            <a:extLst>
-              <a:ext uri="{FF2B5EF4-FFF2-40B4-BE49-F238E27FC236}">
-                <a16:creationId xmlns:a16="http://schemas.microsoft.com/office/drawing/2014/main" id="{02E0C409-730D-455F-AA8F-0646ABDB1B42}"/>
+          <p:cNvPr id="37" name="Freeform: Shape 36">
+            <a:extLst>
+              <a:ext uri="{FF2B5EF4-FFF2-40B4-BE49-F238E27FC236}">
+                <a16:creationId xmlns:a16="http://schemas.microsoft.com/office/drawing/2014/main" id="{7059D4DD-D247-47C8-B574-B36CB222C1B3}"/>
               </a:ext>
               <a:ext uri="{C183D7F6-B498-43B3-948B-1728B52AA6E4}">
                 <adec:decorative xmlns:adec="http://schemas.microsoft.com/office/drawing/2017/decorative" val="1"/>
@@ -4060,21 +3979,45 @@
           </p:nvPr>
         </p:nvSpPr>
         <p:spPr>
-          <a:xfrm>
-            <a:off x="3088973" y="0"/>
-            <a:ext cx="8239927" cy="6858000"/>
+          <a:xfrm rot="16200000" flipH="1" flipV="1">
+            <a:off x="1127553" y="-1127553"/>
+            <a:ext cx="6858000" cy="9113106"/>
           </a:xfrm>
           <a:custGeom>
             <a:avLst/>
             <a:gdLst>
-              <a:gd name="connsiteX0" fmla="*/ 6010593 w 8239927"/>
-              <a:gd name="connsiteY0" fmla="*/ 0 h 6858000"/>
-              <a:gd name="connsiteX1" fmla="*/ 8239927 w 8239927"/>
-              <a:gd name="connsiteY1" fmla="*/ 0 h 6858000"/>
-              <a:gd name="connsiteX2" fmla="*/ 2229335 w 8239927"/>
-              <a:gd name="connsiteY2" fmla="*/ 6858000 h 6858000"/>
-              <a:gd name="connsiteX3" fmla="*/ 0 w 8239927"/>
-              <a:gd name="connsiteY3" fmla="*/ 6858000 h 6858000"/>
+              <a:gd name="connsiteX0" fmla="*/ 0 w 6858000"/>
+              <a:gd name="connsiteY0" fmla="*/ 7143270 h 9113106"/>
+              <a:gd name="connsiteX1" fmla="*/ 0 w 6858000"/>
+              <a:gd name="connsiteY1" fmla="*/ 6878623 h 9113106"/>
+              <a:gd name="connsiteX2" fmla="*/ 1 w 6858000"/>
+              <a:gd name="connsiteY2" fmla="*/ 6878623 h 9113106"/>
+              <a:gd name="connsiteX3" fmla="*/ 0 w 6858000"/>
+              <a:gd name="connsiteY3" fmla="*/ 4319945 h 9113106"/>
+              <a:gd name="connsiteX4" fmla="*/ 1 w 6858000"/>
+              <a:gd name="connsiteY4" fmla="*/ 4319945 h 9113106"/>
+              <a:gd name="connsiteX5" fmla="*/ 1 w 6858000"/>
+              <a:gd name="connsiteY5" fmla="*/ 13542 h 9113106"/>
+              <a:gd name="connsiteX6" fmla="*/ 0 w 6858000"/>
+              <a:gd name="connsiteY6" fmla="*/ 13540 h 9113106"/>
+              <a:gd name="connsiteX7" fmla="*/ 0 w 6858000"/>
+              <a:gd name="connsiteY7" fmla="*/ 0 h 9113106"/>
+              <a:gd name="connsiteX8" fmla="*/ 6858000 w 6858000"/>
+              <a:gd name="connsiteY8" fmla="*/ 6010591 h 9113106"/>
+              <a:gd name="connsiteX9" fmla="*/ 6858000 w 6858000"/>
+              <a:gd name="connsiteY9" fmla="*/ 3794798 h 9113106"/>
+              <a:gd name="connsiteX10" fmla="*/ 6858000 w 6858000"/>
+              <a:gd name="connsiteY10" fmla="*/ 3794798 h 9113106"/>
+              <a:gd name="connsiteX11" fmla="*/ 6858000 w 6858000"/>
+              <a:gd name="connsiteY11" fmla="*/ 3837120 h 9113106"/>
+              <a:gd name="connsiteX12" fmla="*/ 6858000 w 6858000"/>
+              <a:gd name="connsiteY12" fmla="*/ 6838049 h 9113106"/>
+              <a:gd name="connsiteX13" fmla="*/ 6858000 w 6858000"/>
+              <a:gd name="connsiteY13" fmla="*/ 9113106 h 9113106"/>
+              <a:gd name="connsiteX14" fmla="*/ 1 w 6858000"/>
+              <a:gd name="connsiteY14" fmla="*/ 9113106 h 9113106"/>
+              <a:gd name="connsiteX15" fmla="*/ 1 w 6858000"/>
+              <a:gd name="connsiteY15" fmla="*/ 7143270 h 9113106"/>
             </a:gdLst>
             <a:ahLst/>
             <a:cxnLst>
@@ -4090,30 +4033,1245 @@
               <a:cxn ang="0">
                 <a:pos x="connsiteX3" y="connsiteY3"/>
               </a:cxn>
+              <a:cxn ang="0">
+                <a:pos x="connsiteX4" y="connsiteY4"/>
+              </a:cxn>
+              <a:cxn ang="0">
+                <a:pos x="connsiteX5" y="connsiteY5"/>
+              </a:cxn>
+              <a:cxn ang="0">
+                <a:pos x="connsiteX6" y="connsiteY6"/>
+              </a:cxn>
+              <a:cxn ang="0">
+                <a:pos x="connsiteX7" y="connsiteY7"/>
+              </a:cxn>
+              <a:cxn ang="0">
+                <a:pos x="connsiteX8" y="connsiteY8"/>
+              </a:cxn>
+              <a:cxn ang="0">
+                <a:pos x="connsiteX9" y="connsiteY9"/>
+              </a:cxn>
+              <a:cxn ang="0">
+                <a:pos x="connsiteX10" y="connsiteY10"/>
+              </a:cxn>
+              <a:cxn ang="0">
+                <a:pos x="connsiteX11" y="connsiteY11"/>
+              </a:cxn>
+              <a:cxn ang="0">
+                <a:pos x="connsiteX12" y="connsiteY12"/>
+              </a:cxn>
+              <a:cxn ang="0">
+                <a:pos x="connsiteX13" y="connsiteY13"/>
+              </a:cxn>
+              <a:cxn ang="0">
+                <a:pos x="connsiteX14" y="connsiteY14"/>
+              </a:cxn>
+              <a:cxn ang="0">
+                <a:pos x="connsiteX15" y="connsiteY15"/>
+              </a:cxn>
             </a:cxnLst>
             <a:rect l="l" t="t" r="r" b="b"/>
             <a:pathLst>
-              <a:path w="8239927" h="6858000">
+              <a:path w="6858000" h="9113106">
                 <a:moveTo>
-                  <a:pt x="6010593" y="0"/>
+                  <a:pt x="0" y="7143270"/>
                 </a:moveTo>
                 <a:lnTo>
-                  <a:pt x="8239927" y="0"/>
+                  <a:pt x="0" y="6878623"/>
                 </a:lnTo>
                 <a:lnTo>
-                  <a:pt x="2229335" y="6858000"/>
+                  <a:pt x="1" y="6878623"/>
                 </a:lnTo>
                 <a:lnTo>
-                  <a:pt x="0" y="6858000"/>
+                  <a:pt x="0" y="4319945"/>
+                </a:lnTo>
+                <a:lnTo>
+                  <a:pt x="1" y="4319945"/>
+                </a:lnTo>
+                <a:lnTo>
+                  <a:pt x="1" y="13542"/>
+                </a:lnTo>
+                <a:lnTo>
+                  <a:pt x="0" y="13540"/>
+                </a:lnTo>
+                <a:lnTo>
+                  <a:pt x="0" y="0"/>
+                </a:lnTo>
+                <a:lnTo>
+                  <a:pt x="6858000" y="6010591"/>
+                </a:lnTo>
+                <a:lnTo>
+                  <a:pt x="6858000" y="3794798"/>
+                </a:lnTo>
+                <a:lnTo>
+                  <a:pt x="6858000" y="3794798"/>
+                </a:lnTo>
+                <a:lnTo>
+                  <a:pt x="6858000" y="3837120"/>
+                </a:lnTo>
+                <a:lnTo>
+                  <a:pt x="6858000" y="6838049"/>
+                </a:lnTo>
+                <a:lnTo>
+                  <a:pt x="6858000" y="9113106"/>
+                </a:lnTo>
+                <a:lnTo>
+                  <a:pt x="1" y="9113106"/>
+                </a:lnTo>
+                <a:lnTo>
+                  <a:pt x="1" y="7143270"/>
                 </a:lnTo>
                 <a:close/>
               </a:path>
             </a:pathLst>
           </a:custGeom>
           <a:solidFill>
-            <a:schemeClr val="bg2">
+            <a:srgbClr val="000000">
               <a:alpha val="60000"/>
+            </a:srgbClr>
+          </a:solidFill>
+          <a:ln>
+            <a:noFill/>
+          </a:ln>
+        </p:spPr>
+        <p:style>
+          <a:lnRef idx="2">
+            <a:schemeClr val="accent1">
+              <a:shade val="50000"/>
             </a:schemeClr>
+          </a:lnRef>
+          <a:fillRef idx="1">
+            <a:schemeClr val="accent1"/>
+          </a:fillRef>
+          <a:effectRef idx="0">
+            <a:schemeClr val="accent1"/>
+          </a:effectRef>
+          <a:fontRef idx="minor">
+            <a:schemeClr val="lt1"/>
+          </a:fontRef>
+        </p:style>
+        <p:txBody>
+          <a:bodyPr wrap="square" rtlCol="0" anchor="ctr">
+            <a:noAutofit/>
+          </a:bodyPr>
+          <a:lstStyle/>
+          <a:p>
+            <a:pPr algn="ctr"/>
+            <a:endParaRPr lang="en-US"/>
+          </a:p>
+        </p:txBody>
+      </p:sp>
+      <p:sp>
+        <p:nvSpPr>
+          <p:cNvPr id="2" name="Title 1">
+            <a:extLst>
+              <a:ext uri="{FF2B5EF4-FFF2-40B4-BE49-F238E27FC236}">
+                <a16:creationId xmlns:a16="http://schemas.microsoft.com/office/drawing/2014/main" id="{581860CC-17F0-0903-F4A8-DC8061CEC54D}"/>
+              </a:ext>
+            </a:extLst>
+          </p:cNvPr>
+          <p:cNvSpPr>
+            <a:spLocks noGrp="1"/>
+          </p:cNvSpPr>
+          <p:nvPr>
+            <p:ph type="ctrTitle"/>
+          </p:nvPr>
+        </p:nvSpPr>
+        <p:spPr>
+          <a:xfrm>
+            <a:off x="1143001" y="1181101"/>
+            <a:ext cx="4953000" cy="2832404"/>
+          </a:xfrm>
+        </p:spPr>
+        <p:txBody>
+          <a:bodyPr anchor="t">
+            <a:normAutofit/>
+          </a:bodyPr>
+          <a:lstStyle/>
+          <a:p>
+            <a:pPr>
+              <a:lnSpc>
+                <a:spcPct val="90000"/>
+              </a:lnSpc>
+            </a:pPr>
+            <a:r>
+              <a:rPr lang="en-US">
+                <a:solidFill>
+                  <a:srgbClr val="FFFFFF"/>
+                </a:solidFill>
+              </a:rPr>
+              <a:t>Getting Started with GitHub Actions</a:t>
+            </a:r>
+          </a:p>
+        </p:txBody>
+      </p:sp>
+      <p:sp>
+        <p:nvSpPr>
+          <p:cNvPr id="3" name="Subtitle 2">
+            <a:extLst>
+              <a:ext uri="{FF2B5EF4-FFF2-40B4-BE49-F238E27FC236}">
+                <a16:creationId xmlns:a16="http://schemas.microsoft.com/office/drawing/2014/main" id="{64E78011-366F-5481-85AC-329EED43DEB3}"/>
+              </a:ext>
+            </a:extLst>
+          </p:cNvPr>
+          <p:cNvSpPr>
+            <a:spLocks noGrp="1"/>
+          </p:cNvSpPr>
+          <p:nvPr>
+            <p:ph type="subTitle" idx="1"/>
+          </p:nvPr>
+        </p:nvSpPr>
+        <p:spPr>
+          <a:xfrm>
+            <a:off x="1143002" y="4535293"/>
+            <a:ext cx="2561794" cy="1291887"/>
+          </a:xfrm>
+        </p:spPr>
+        <p:txBody>
+          <a:bodyPr anchor="b">
+            <a:normAutofit/>
+          </a:bodyPr>
+          <a:lstStyle/>
+          <a:p>
+            <a:endParaRPr lang="en-US">
+              <a:solidFill>
+                <a:srgbClr val="FFFFFF"/>
+              </a:solidFill>
+            </a:endParaRPr>
+          </a:p>
+        </p:txBody>
+      </p:sp>
+    </p:spTree>
+    <p:extLst>
+      <p:ext uri="{BB962C8B-B14F-4D97-AF65-F5344CB8AC3E}">
+        <p14:creationId xmlns:p14="http://schemas.microsoft.com/office/powerpoint/2010/main" val="2757586524"/>
+      </p:ext>
+    </p:extLst>
+  </p:cSld>
+  <p:clrMapOvr>
+    <a:masterClrMapping/>
+  </p:clrMapOvr>
+</p:sld>
+</file>
+
+<file path=ppt/slides/slide10.xml><?xml version="1.0" encoding="utf-8"?>
+<p:sld xmlns:a="http://schemas.openxmlformats.org/drawingml/2006/main" xmlns:r="http://schemas.openxmlformats.org/officeDocument/2006/relationships" xmlns:p="http://schemas.openxmlformats.org/presentationml/2006/main">
+  <p:cSld>
+    <p:spTree>
+      <p:nvGrpSpPr>
+        <p:cNvPr id="1" name=""/>
+        <p:cNvGrpSpPr/>
+        <p:nvPr/>
+      </p:nvGrpSpPr>
+      <p:grpSpPr>
+        <a:xfrm>
+          <a:off x="0" y="0"/>
+          <a:ext cx="0" cy="0"/>
+          <a:chOff x="0" y="0"/>
+          <a:chExt cx="0" cy="0"/>
+        </a:xfrm>
+      </p:grpSpPr>
+      <p:sp>
+        <p:nvSpPr>
+          <p:cNvPr id="2" name="Title 1">
+            <a:extLst>
+              <a:ext uri="{FF2B5EF4-FFF2-40B4-BE49-F238E27FC236}">
+                <a16:creationId xmlns:a16="http://schemas.microsoft.com/office/drawing/2014/main" id="{96CD9417-4563-CF61-CBBA-320028757685}"/>
+              </a:ext>
+            </a:extLst>
+          </p:cNvPr>
+          <p:cNvSpPr>
+            <a:spLocks noGrp="1"/>
+          </p:cNvSpPr>
+          <p:nvPr>
+            <p:ph type="title"/>
+          </p:nvPr>
+        </p:nvSpPr>
+        <p:spPr/>
+        <p:txBody>
+          <a:bodyPr/>
+          <a:lstStyle/>
+          <a:p>
+            <a:r>
+              <a:rPr lang="en-US" b="0" i="0" dirty="0">
+                <a:solidFill>
+                  <a:srgbClr val="374151"/>
+                </a:solidFill>
+                <a:effectLst/>
+                <a:latin typeface="Söhne"/>
+              </a:rPr>
+              <a:t>F. Adding workflow steps</a:t>
+            </a:r>
+            <a:endParaRPr lang="en-US" dirty="0"/>
+          </a:p>
+        </p:txBody>
+      </p:sp>
+      <p:sp>
+        <p:nvSpPr>
+          <p:cNvPr id="3" name="Content Placeholder 2">
+            <a:extLst>
+              <a:ext uri="{FF2B5EF4-FFF2-40B4-BE49-F238E27FC236}">
+                <a16:creationId xmlns:a16="http://schemas.microsoft.com/office/drawing/2014/main" id="{77F04A91-7CFA-3EDC-0CB2-A037A73DF9C6}"/>
+              </a:ext>
+            </a:extLst>
+          </p:cNvPr>
+          <p:cNvSpPr>
+            <a:spLocks noGrp="1"/>
+          </p:cNvSpPr>
+          <p:nvPr>
+            <p:ph idx="1"/>
+          </p:nvPr>
+        </p:nvSpPr>
+        <p:spPr/>
+        <p:txBody>
+          <a:bodyPr/>
+          <a:lstStyle/>
+          <a:p>
+            <a:endParaRPr lang="en-US"/>
+          </a:p>
+        </p:txBody>
+      </p:sp>
+    </p:spTree>
+    <p:extLst>
+      <p:ext uri="{BB962C8B-B14F-4D97-AF65-F5344CB8AC3E}">
+        <p14:creationId xmlns:p14="http://schemas.microsoft.com/office/powerpoint/2010/main" val="4016695534"/>
+      </p:ext>
+    </p:extLst>
+  </p:cSld>
+  <p:clrMapOvr>
+    <a:masterClrMapping/>
+  </p:clrMapOvr>
+</p:sld>
+</file>
+
+<file path=ppt/slides/slide11.xml><?xml version="1.0" encoding="utf-8"?>
+<p:sld xmlns:a="http://schemas.openxmlformats.org/drawingml/2006/main" xmlns:r="http://schemas.openxmlformats.org/officeDocument/2006/relationships" xmlns:p="http://schemas.openxmlformats.org/presentationml/2006/main">
+  <p:cSld>
+    <p:spTree>
+      <p:nvGrpSpPr>
+        <p:cNvPr id="1" name=""/>
+        <p:cNvGrpSpPr/>
+        <p:nvPr/>
+      </p:nvGrpSpPr>
+      <p:grpSpPr>
+        <a:xfrm>
+          <a:off x="0" y="0"/>
+          <a:ext cx="0" cy="0"/>
+          <a:chOff x="0" y="0"/>
+          <a:chExt cx="0" cy="0"/>
+        </a:xfrm>
+      </p:grpSpPr>
+      <p:sp>
+        <p:nvSpPr>
+          <p:cNvPr id="2" name="Title 1">
+            <a:extLst>
+              <a:ext uri="{FF2B5EF4-FFF2-40B4-BE49-F238E27FC236}">
+                <a16:creationId xmlns:a16="http://schemas.microsoft.com/office/drawing/2014/main" id="{6878C9FA-30AE-4B4E-826C-FC63EAD1A36A}"/>
+              </a:ext>
+            </a:extLst>
+          </p:cNvPr>
+          <p:cNvSpPr>
+            <a:spLocks noGrp="1"/>
+          </p:cNvSpPr>
+          <p:nvPr>
+            <p:ph type="title"/>
+          </p:nvPr>
+        </p:nvSpPr>
+        <p:spPr/>
+        <p:txBody>
+          <a:bodyPr/>
+          <a:lstStyle/>
+          <a:p>
+            <a:r>
+              <a:rPr lang="en-US" b="0" i="0" dirty="0">
+                <a:solidFill>
+                  <a:srgbClr val="374151"/>
+                </a:solidFill>
+                <a:effectLst/>
+                <a:latin typeface="Söhne"/>
+              </a:rPr>
+              <a:t>G. Workflow syntax</a:t>
+            </a:r>
+            <a:endParaRPr lang="en-US" dirty="0"/>
+          </a:p>
+        </p:txBody>
+      </p:sp>
+      <p:sp>
+        <p:nvSpPr>
+          <p:cNvPr id="3" name="Content Placeholder 2">
+            <a:extLst>
+              <a:ext uri="{FF2B5EF4-FFF2-40B4-BE49-F238E27FC236}">
+                <a16:creationId xmlns:a16="http://schemas.microsoft.com/office/drawing/2014/main" id="{CDBDF93D-85D9-A569-1EB8-E82F7401B423}"/>
+              </a:ext>
+            </a:extLst>
+          </p:cNvPr>
+          <p:cNvSpPr>
+            <a:spLocks noGrp="1"/>
+          </p:cNvSpPr>
+          <p:nvPr>
+            <p:ph idx="1"/>
+          </p:nvPr>
+        </p:nvSpPr>
+        <p:spPr/>
+        <p:txBody>
+          <a:bodyPr/>
+          <a:lstStyle/>
+          <a:p>
+            <a:endParaRPr lang="en-US"/>
+          </a:p>
+        </p:txBody>
+      </p:sp>
+    </p:spTree>
+    <p:extLst>
+      <p:ext uri="{BB962C8B-B14F-4D97-AF65-F5344CB8AC3E}">
+        <p14:creationId xmlns:p14="http://schemas.microsoft.com/office/powerpoint/2010/main" val="1771306589"/>
+      </p:ext>
+    </p:extLst>
+  </p:cSld>
+  <p:clrMapOvr>
+    <a:masterClrMapping/>
+  </p:clrMapOvr>
+</p:sld>
+</file>
+
+<file path=ppt/slides/slide12.xml><?xml version="1.0" encoding="utf-8"?>
+<p:sld xmlns:a="http://schemas.openxmlformats.org/drawingml/2006/main" xmlns:r="http://schemas.openxmlformats.org/officeDocument/2006/relationships" xmlns:p="http://schemas.openxmlformats.org/presentationml/2006/main">
+  <p:cSld>
+    <p:spTree>
+      <p:nvGrpSpPr>
+        <p:cNvPr id="1" name=""/>
+        <p:cNvGrpSpPr/>
+        <p:nvPr/>
+      </p:nvGrpSpPr>
+      <p:grpSpPr>
+        <a:xfrm>
+          <a:off x="0" y="0"/>
+          <a:ext cx="0" cy="0"/>
+          <a:chOff x="0" y="0"/>
+          <a:chExt cx="0" cy="0"/>
+        </a:xfrm>
+      </p:grpSpPr>
+      <p:sp>
+        <p:nvSpPr>
+          <p:cNvPr id="2" name="Title 1">
+            <a:extLst>
+              <a:ext uri="{FF2B5EF4-FFF2-40B4-BE49-F238E27FC236}">
+                <a16:creationId xmlns:a16="http://schemas.microsoft.com/office/drawing/2014/main" id="{16D214DD-F7C7-C073-75D1-F1B388CDA60B}"/>
+              </a:ext>
+            </a:extLst>
+          </p:cNvPr>
+          <p:cNvSpPr>
+            <a:spLocks noGrp="1"/>
+          </p:cNvSpPr>
+          <p:nvPr>
+            <p:ph type="title"/>
+          </p:nvPr>
+        </p:nvSpPr>
+        <p:spPr/>
+        <p:txBody>
+          <a:bodyPr>
+            <a:normAutofit/>
+          </a:bodyPr>
+          <a:lstStyle/>
+          <a:p>
+            <a:r>
+              <a:rPr lang="en-US" b="0" i="0" dirty="0">
+                <a:solidFill>
+                  <a:srgbClr val="374151"/>
+                </a:solidFill>
+                <a:effectLst/>
+                <a:latin typeface="Söhne"/>
+              </a:rPr>
+              <a:t>III. Running GitHub Actions workflows A. Triggering workflows manually</a:t>
+            </a:r>
+            <a:endParaRPr lang="en-US" dirty="0"/>
+          </a:p>
+        </p:txBody>
+      </p:sp>
+      <p:sp>
+        <p:nvSpPr>
+          <p:cNvPr id="3" name="Content Placeholder 2">
+            <a:extLst>
+              <a:ext uri="{FF2B5EF4-FFF2-40B4-BE49-F238E27FC236}">
+                <a16:creationId xmlns:a16="http://schemas.microsoft.com/office/drawing/2014/main" id="{1412E492-0532-8A2B-E094-8A81DB0FBFC2}"/>
+              </a:ext>
+            </a:extLst>
+          </p:cNvPr>
+          <p:cNvSpPr>
+            <a:spLocks noGrp="1"/>
+          </p:cNvSpPr>
+          <p:nvPr>
+            <p:ph idx="1"/>
+          </p:nvPr>
+        </p:nvSpPr>
+        <p:spPr/>
+        <p:txBody>
+          <a:bodyPr/>
+          <a:lstStyle/>
+          <a:p>
+            <a:endParaRPr lang="en-US"/>
+          </a:p>
+        </p:txBody>
+      </p:sp>
+    </p:spTree>
+    <p:extLst>
+      <p:ext uri="{BB962C8B-B14F-4D97-AF65-F5344CB8AC3E}">
+        <p14:creationId xmlns:p14="http://schemas.microsoft.com/office/powerpoint/2010/main" val="2419761565"/>
+      </p:ext>
+    </p:extLst>
+  </p:cSld>
+  <p:clrMapOvr>
+    <a:masterClrMapping/>
+  </p:clrMapOvr>
+</p:sld>
+</file>
+
+<file path=ppt/slides/slide13.xml><?xml version="1.0" encoding="utf-8"?>
+<p:sld xmlns:a="http://schemas.openxmlformats.org/drawingml/2006/main" xmlns:r="http://schemas.openxmlformats.org/officeDocument/2006/relationships" xmlns:p="http://schemas.openxmlformats.org/presentationml/2006/main">
+  <p:cSld>
+    <p:spTree>
+      <p:nvGrpSpPr>
+        <p:cNvPr id="1" name=""/>
+        <p:cNvGrpSpPr/>
+        <p:nvPr/>
+      </p:nvGrpSpPr>
+      <p:grpSpPr>
+        <a:xfrm>
+          <a:off x="0" y="0"/>
+          <a:ext cx="0" cy="0"/>
+          <a:chOff x="0" y="0"/>
+          <a:chExt cx="0" cy="0"/>
+        </a:xfrm>
+      </p:grpSpPr>
+      <p:sp>
+        <p:nvSpPr>
+          <p:cNvPr id="2" name="Title 1">
+            <a:extLst>
+              <a:ext uri="{FF2B5EF4-FFF2-40B4-BE49-F238E27FC236}">
+                <a16:creationId xmlns:a16="http://schemas.microsoft.com/office/drawing/2014/main" id="{553E13A8-D00F-18B7-8130-5BBDE9CD098E}"/>
+              </a:ext>
+            </a:extLst>
+          </p:cNvPr>
+          <p:cNvSpPr>
+            <a:spLocks noGrp="1"/>
+          </p:cNvSpPr>
+          <p:nvPr>
+            <p:ph type="title"/>
+          </p:nvPr>
+        </p:nvSpPr>
+        <p:spPr/>
+        <p:txBody>
+          <a:bodyPr>
+            <a:normAutofit/>
+          </a:bodyPr>
+          <a:lstStyle/>
+          <a:p>
+            <a:r>
+              <a:rPr lang="en-US" b="0" i="0" dirty="0">
+                <a:solidFill>
+                  <a:srgbClr val="374151"/>
+                </a:solidFill>
+                <a:effectLst/>
+                <a:latin typeface="Söhne"/>
+              </a:rPr>
+              <a:t>B. Triggering workflows automatically</a:t>
+            </a:r>
+            <a:br>
+              <a:rPr lang="en-US" b="0" i="0" dirty="0">
+                <a:solidFill>
+                  <a:srgbClr val="374151"/>
+                </a:solidFill>
+                <a:effectLst/>
+                <a:latin typeface="Söhne"/>
+              </a:rPr>
+            </a:br>
+            <a:endParaRPr lang="en-US" dirty="0"/>
+          </a:p>
+        </p:txBody>
+      </p:sp>
+      <p:sp>
+        <p:nvSpPr>
+          <p:cNvPr id="3" name="Content Placeholder 2">
+            <a:extLst>
+              <a:ext uri="{FF2B5EF4-FFF2-40B4-BE49-F238E27FC236}">
+                <a16:creationId xmlns:a16="http://schemas.microsoft.com/office/drawing/2014/main" id="{A004B485-F917-4B4B-C8A8-E7C3D86F4C93}"/>
+              </a:ext>
+            </a:extLst>
+          </p:cNvPr>
+          <p:cNvSpPr>
+            <a:spLocks noGrp="1"/>
+          </p:cNvSpPr>
+          <p:nvPr>
+            <p:ph idx="1"/>
+          </p:nvPr>
+        </p:nvSpPr>
+        <p:spPr/>
+        <p:txBody>
+          <a:bodyPr/>
+          <a:lstStyle/>
+          <a:p>
+            <a:endParaRPr lang="en-US"/>
+          </a:p>
+        </p:txBody>
+      </p:sp>
+    </p:spTree>
+    <p:extLst>
+      <p:ext uri="{BB962C8B-B14F-4D97-AF65-F5344CB8AC3E}">
+        <p14:creationId xmlns:p14="http://schemas.microsoft.com/office/powerpoint/2010/main" val="4061049267"/>
+      </p:ext>
+    </p:extLst>
+  </p:cSld>
+  <p:clrMapOvr>
+    <a:masterClrMapping/>
+  </p:clrMapOvr>
+</p:sld>
+</file>
+
+<file path=ppt/slides/slide14.xml><?xml version="1.0" encoding="utf-8"?>
+<p:sld xmlns:a="http://schemas.openxmlformats.org/drawingml/2006/main" xmlns:r="http://schemas.openxmlformats.org/officeDocument/2006/relationships" xmlns:p="http://schemas.openxmlformats.org/presentationml/2006/main">
+  <p:cSld>
+    <p:spTree>
+      <p:nvGrpSpPr>
+        <p:cNvPr id="1" name=""/>
+        <p:cNvGrpSpPr/>
+        <p:nvPr/>
+      </p:nvGrpSpPr>
+      <p:grpSpPr>
+        <a:xfrm>
+          <a:off x="0" y="0"/>
+          <a:ext cx="0" cy="0"/>
+          <a:chOff x="0" y="0"/>
+          <a:chExt cx="0" cy="0"/>
+        </a:xfrm>
+      </p:grpSpPr>
+      <p:sp>
+        <p:nvSpPr>
+          <p:cNvPr id="2" name="Title 1">
+            <a:extLst>
+              <a:ext uri="{FF2B5EF4-FFF2-40B4-BE49-F238E27FC236}">
+                <a16:creationId xmlns:a16="http://schemas.microsoft.com/office/drawing/2014/main" id="{64723E9D-93C4-142C-5491-CA85C125C082}"/>
+              </a:ext>
+            </a:extLst>
+          </p:cNvPr>
+          <p:cNvSpPr>
+            <a:spLocks noGrp="1"/>
+          </p:cNvSpPr>
+          <p:nvPr>
+            <p:ph type="title"/>
+          </p:nvPr>
+        </p:nvSpPr>
+        <p:spPr/>
+        <p:txBody>
+          <a:bodyPr/>
+          <a:lstStyle/>
+          <a:p>
+            <a:r>
+              <a:rPr lang="en-US" b="0" i="0" dirty="0">
+                <a:solidFill>
+                  <a:srgbClr val="374151"/>
+                </a:solidFill>
+                <a:effectLst/>
+                <a:latin typeface="Söhne"/>
+              </a:rPr>
+              <a:t>C. Running workflows locally</a:t>
+            </a:r>
+            <a:endParaRPr lang="en-US" dirty="0"/>
+          </a:p>
+        </p:txBody>
+      </p:sp>
+      <p:sp>
+        <p:nvSpPr>
+          <p:cNvPr id="3" name="Content Placeholder 2">
+            <a:extLst>
+              <a:ext uri="{FF2B5EF4-FFF2-40B4-BE49-F238E27FC236}">
+                <a16:creationId xmlns:a16="http://schemas.microsoft.com/office/drawing/2014/main" id="{AE3A3F16-4D15-8482-9BAA-4F7F2CCAC98C}"/>
+              </a:ext>
+            </a:extLst>
+          </p:cNvPr>
+          <p:cNvSpPr>
+            <a:spLocks noGrp="1"/>
+          </p:cNvSpPr>
+          <p:nvPr>
+            <p:ph idx="1"/>
+          </p:nvPr>
+        </p:nvSpPr>
+        <p:spPr/>
+        <p:txBody>
+          <a:bodyPr/>
+          <a:lstStyle/>
+          <a:p>
+            <a:endParaRPr lang="en-US"/>
+          </a:p>
+        </p:txBody>
+      </p:sp>
+    </p:spTree>
+    <p:extLst>
+      <p:ext uri="{BB962C8B-B14F-4D97-AF65-F5344CB8AC3E}">
+        <p14:creationId xmlns:p14="http://schemas.microsoft.com/office/powerpoint/2010/main" val="1019749731"/>
+      </p:ext>
+    </p:extLst>
+  </p:cSld>
+  <p:clrMapOvr>
+    <a:masterClrMapping/>
+  </p:clrMapOvr>
+</p:sld>
+</file>
+
+<file path=ppt/slides/slide15.xml><?xml version="1.0" encoding="utf-8"?>
+<p:sld xmlns:a="http://schemas.openxmlformats.org/drawingml/2006/main" xmlns:r="http://schemas.openxmlformats.org/officeDocument/2006/relationships" xmlns:p="http://schemas.openxmlformats.org/presentationml/2006/main">
+  <p:cSld>
+    <p:spTree>
+      <p:nvGrpSpPr>
+        <p:cNvPr id="1" name=""/>
+        <p:cNvGrpSpPr/>
+        <p:nvPr/>
+      </p:nvGrpSpPr>
+      <p:grpSpPr>
+        <a:xfrm>
+          <a:off x="0" y="0"/>
+          <a:ext cx="0" cy="0"/>
+          <a:chOff x="0" y="0"/>
+          <a:chExt cx="0" cy="0"/>
+        </a:xfrm>
+      </p:grpSpPr>
+      <p:sp>
+        <p:nvSpPr>
+          <p:cNvPr id="2" name="Title 1">
+            <a:extLst>
+              <a:ext uri="{FF2B5EF4-FFF2-40B4-BE49-F238E27FC236}">
+                <a16:creationId xmlns:a16="http://schemas.microsoft.com/office/drawing/2014/main" id="{CF88086E-B515-7286-E9B9-C0D9363613D5}"/>
+              </a:ext>
+            </a:extLst>
+          </p:cNvPr>
+          <p:cNvSpPr>
+            <a:spLocks noGrp="1"/>
+          </p:cNvSpPr>
+          <p:nvPr>
+            <p:ph type="title"/>
+          </p:nvPr>
+        </p:nvSpPr>
+        <p:spPr/>
+        <p:txBody>
+          <a:bodyPr/>
+          <a:lstStyle/>
+          <a:p>
+            <a:r>
+              <a:rPr lang="en-US" b="0" i="0" dirty="0">
+                <a:solidFill>
+                  <a:srgbClr val="374151"/>
+                </a:solidFill>
+                <a:effectLst/>
+                <a:latin typeface="Söhne"/>
+              </a:rPr>
+              <a:t>D. Viewing workflow results</a:t>
+            </a:r>
+            <a:endParaRPr lang="en-US" dirty="0"/>
+          </a:p>
+        </p:txBody>
+      </p:sp>
+      <p:sp>
+        <p:nvSpPr>
+          <p:cNvPr id="3" name="Content Placeholder 2">
+            <a:extLst>
+              <a:ext uri="{FF2B5EF4-FFF2-40B4-BE49-F238E27FC236}">
+                <a16:creationId xmlns:a16="http://schemas.microsoft.com/office/drawing/2014/main" id="{B1B0658D-EE97-190B-14DC-A9FF74904B89}"/>
+              </a:ext>
+            </a:extLst>
+          </p:cNvPr>
+          <p:cNvSpPr>
+            <a:spLocks noGrp="1"/>
+          </p:cNvSpPr>
+          <p:nvPr>
+            <p:ph idx="1"/>
+          </p:nvPr>
+        </p:nvSpPr>
+        <p:spPr/>
+        <p:txBody>
+          <a:bodyPr/>
+          <a:lstStyle/>
+          <a:p>
+            <a:endParaRPr lang="en-US"/>
+          </a:p>
+        </p:txBody>
+      </p:sp>
+    </p:spTree>
+    <p:extLst>
+      <p:ext uri="{BB962C8B-B14F-4D97-AF65-F5344CB8AC3E}">
+        <p14:creationId xmlns:p14="http://schemas.microsoft.com/office/powerpoint/2010/main" val="4086119069"/>
+      </p:ext>
+    </p:extLst>
+  </p:cSld>
+  <p:clrMapOvr>
+    <a:masterClrMapping/>
+  </p:clrMapOvr>
+</p:sld>
+</file>
+
+<file path=ppt/slides/slide16.xml><?xml version="1.0" encoding="utf-8"?>
+<p:sld xmlns:a="http://schemas.openxmlformats.org/drawingml/2006/main" xmlns:r="http://schemas.openxmlformats.org/officeDocument/2006/relationships" xmlns:p="http://schemas.openxmlformats.org/presentationml/2006/main">
+  <p:cSld>
+    <p:spTree>
+      <p:nvGrpSpPr>
+        <p:cNvPr id="1" name=""/>
+        <p:cNvGrpSpPr/>
+        <p:nvPr/>
+      </p:nvGrpSpPr>
+      <p:grpSpPr>
+        <a:xfrm>
+          <a:off x="0" y="0"/>
+          <a:ext cx="0" cy="0"/>
+          <a:chOff x="0" y="0"/>
+          <a:chExt cx="0" cy="0"/>
+        </a:xfrm>
+      </p:grpSpPr>
+      <p:sp>
+        <p:nvSpPr>
+          <p:cNvPr id="2" name="Title 1">
+            <a:extLst>
+              <a:ext uri="{FF2B5EF4-FFF2-40B4-BE49-F238E27FC236}">
+                <a16:creationId xmlns:a16="http://schemas.microsoft.com/office/drawing/2014/main" id="{E271EF7E-2A2B-8376-54CB-AFB871DF12E3}"/>
+              </a:ext>
+            </a:extLst>
+          </p:cNvPr>
+          <p:cNvSpPr>
+            <a:spLocks noGrp="1"/>
+          </p:cNvSpPr>
+          <p:nvPr>
+            <p:ph type="title"/>
+          </p:nvPr>
+        </p:nvSpPr>
+        <p:spPr/>
+        <p:txBody>
+          <a:bodyPr>
+            <a:normAutofit/>
+          </a:bodyPr>
+          <a:lstStyle/>
+          <a:p>
+            <a:r>
+              <a:rPr lang="en-US" b="0" i="0" dirty="0">
+                <a:solidFill>
+                  <a:srgbClr val="374151"/>
+                </a:solidFill>
+                <a:effectLst/>
+                <a:latin typeface="Söhne"/>
+              </a:rPr>
+              <a:t>IV. Customizing GitHub Actions workflows A. Using actions from the GitHub Marketplace</a:t>
+            </a:r>
+            <a:endParaRPr lang="en-US" dirty="0"/>
+          </a:p>
+        </p:txBody>
+      </p:sp>
+      <p:sp>
+        <p:nvSpPr>
+          <p:cNvPr id="3" name="Content Placeholder 2">
+            <a:extLst>
+              <a:ext uri="{FF2B5EF4-FFF2-40B4-BE49-F238E27FC236}">
+                <a16:creationId xmlns:a16="http://schemas.microsoft.com/office/drawing/2014/main" id="{D3C9722D-8EBA-80DE-1818-9743C5819BAE}"/>
+              </a:ext>
+            </a:extLst>
+          </p:cNvPr>
+          <p:cNvSpPr>
+            <a:spLocks noGrp="1"/>
+          </p:cNvSpPr>
+          <p:nvPr>
+            <p:ph idx="1"/>
+          </p:nvPr>
+        </p:nvSpPr>
+        <p:spPr/>
+        <p:txBody>
+          <a:bodyPr/>
+          <a:lstStyle/>
+          <a:p>
+            <a:endParaRPr lang="en-US"/>
+          </a:p>
+        </p:txBody>
+      </p:sp>
+    </p:spTree>
+    <p:extLst>
+      <p:ext uri="{BB962C8B-B14F-4D97-AF65-F5344CB8AC3E}">
+        <p14:creationId xmlns:p14="http://schemas.microsoft.com/office/powerpoint/2010/main" val="89828297"/>
+      </p:ext>
+    </p:extLst>
+  </p:cSld>
+  <p:clrMapOvr>
+    <a:masterClrMapping/>
+  </p:clrMapOvr>
+</p:sld>
+</file>
+
+<file path=ppt/slides/slide17.xml><?xml version="1.0" encoding="utf-8"?>
+<p:sld xmlns:a="http://schemas.openxmlformats.org/drawingml/2006/main" xmlns:r="http://schemas.openxmlformats.org/officeDocument/2006/relationships" xmlns:p="http://schemas.openxmlformats.org/presentationml/2006/main">
+  <p:cSld>
+    <p:spTree>
+      <p:nvGrpSpPr>
+        <p:cNvPr id="1" name=""/>
+        <p:cNvGrpSpPr/>
+        <p:nvPr/>
+      </p:nvGrpSpPr>
+      <p:grpSpPr>
+        <a:xfrm>
+          <a:off x="0" y="0"/>
+          <a:ext cx="0" cy="0"/>
+          <a:chOff x="0" y="0"/>
+          <a:chExt cx="0" cy="0"/>
+        </a:xfrm>
+      </p:grpSpPr>
+      <p:sp>
+        <p:nvSpPr>
+          <p:cNvPr id="2" name="Title 1">
+            <a:extLst>
+              <a:ext uri="{FF2B5EF4-FFF2-40B4-BE49-F238E27FC236}">
+                <a16:creationId xmlns:a16="http://schemas.microsoft.com/office/drawing/2014/main" id="{2656425F-7864-31D1-3385-E0CED44370C7}"/>
+              </a:ext>
+            </a:extLst>
+          </p:cNvPr>
+          <p:cNvSpPr>
+            <a:spLocks noGrp="1"/>
+          </p:cNvSpPr>
+          <p:nvPr>
+            <p:ph type="title"/>
+          </p:nvPr>
+        </p:nvSpPr>
+        <p:spPr/>
+        <p:txBody>
+          <a:bodyPr>
+            <a:normAutofit/>
+          </a:bodyPr>
+          <a:lstStyle/>
+          <a:p>
+            <a:r>
+              <a:rPr lang="en-US" b="0" i="0" dirty="0">
+                <a:solidFill>
+                  <a:srgbClr val="374151"/>
+                </a:solidFill>
+                <a:effectLst/>
+                <a:latin typeface="Söhne"/>
+              </a:rPr>
+              <a:t>B. Creating custom actions</a:t>
+            </a:r>
+            <a:br>
+              <a:rPr lang="en-US" b="0" i="0" dirty="0">
+                <a:solidFill>
+                  <a:srgbClr val="374151"/>
+                </a:solidFill>
+                <a:effectLst/>
+                <a:latin typeface="Söhne"/>
+              </a:rPr>
+            </a:br>
+            <a:endParaRPr lang="en-US" dirty="0"/>
+          </a:p>
+        </p:txBody>
+      </p:sp>
+      <p:sp>
+        <p:nvSpPr>
+          <p:cNvPr id="3" name="Content Placeholder 2">
+            <a:extLst>
+              <a:ext uri="{FF2B5EF4-FFF2-40B4-BE49-F238E27FC236}">
+                <a16:creationId xmlns:a16="http://schemas.microsoft.com/office/drawing/2014/main" id="{EEEBA608-08BB-0703-7F15-399192A03B64}"/>
+              </a:ext>
+            </a:extLst>
+          </p:cNvPr>
+          <p:cNvSpPr>
+            <a:spLocks noGrp="1"/>
+          </p:cNvSpPr>
+          <p:nvPr>
+            <p:ph idx="1"/>
+          </p:nvPr>
+        </p:nvSpPr>
+        <p:spPr/>
+        <p:txBody>
+          <a:bodyPr/>
+          <a:lstStyle/>
+          <a:p>
+            <a:endParaRPr lang="en-US"/>
+          </a:p>
+        </p:txBody>
+      </p:sp>
+    </p:spTree>
+    <p:extLst>
+      <p:ext uri="{BB962C8B-B14F-4D97-AF65-F5344CB8AC3E}">
+        <p14:creationId xmlns:p14="http://schemas.microsoft.com/office/powerpoint/2010/main" val="4210812375"/>
+      </p:ext>
+    </p:extLst>
+  </p:cSld>
+  <p:clrMapOvr>
+    <a:masterClrMapping/>
+  </p:clrMapOvr>
+</p:sld>
+</file>
+
+<file path=ppt/slides/slide18.xml><?xml version="1.0" encoding="utf-8"?>
+<p:sld xmlns:a="http://schemas.openxmlformats.org/drawingml/2006/main" xmlns:r="http://schemas.openxmlformats.org/officeDocument/2006/relationships" xmlns:p="http://schemas.openxmlformats.org/presentationml/2006/main">
+  <p:cSld>
+    <p:spTree>
+      <p:nvGrpSpPr>
+        <p:cNvPr id="1" name=""/>
+        <p:cNvGrpSpPr/>
+        <p:nvPr/>
+      </p:nvGrpSpPr>
+      <p:grpSpPr>
+        <a:xfrm>
+          <a:off x="0" y="0"/>
+          <a:ext cx="0" cy="0"/>
+          <a:chOff x="0" y="0"/>
+          <a:chExt cx="0" cy="0"/>
+        </a:xfrm>
+      </p:grpSpPr>
+      <p:sp>
+        <p:nvSpPr>
+          <p:cNvPr id="2" name="Title 1">
+            <a:extLst>
+              <a:ext uri="{FF2B5EF4-FFF2-40B4-BE49-F238E27FC236}">
+                <a16:creationId xmlns:a16="http://schemas.microsoft.com/office/drawing/2014/main" id="{66478796-F367-10D9-DCFA-8A878789B5DA}"/>
+              </a:ext>
+            </a:extLst>
+          </p:cNvPr>
+          <p:cNvSpPr>
+            <a:spLocks noGrp="1"/>
+          </p:cNvSpPr>
+          <p:nvPr>
+            <p:ph type="title"/>
+          </p:nvPr>
+        </p:nvSpPr>
+        <p:spPr/>
+        <p:txBody>
+          <a:bodyPr/>
+          <a:lstStyle/>
+          <a:p>
+            <a:r>
+              <a:rPr lang="en-US" b="0" i="0" dirty="0">
+                <a:solidFill>
+                  <a:srgbClr val="374151"/>
+                </a:solidFill>
+                <a:effectLst/>
+                <a:latin typeface="Söhne"/>
+              </a:rPr>
+              <a:t>C. Sharing workflows with other repositories</a:t>
+            </a:r>
+            <a:endParaRPr lang="en-US" dirty="0"/>
+          </a:p>
+        </p:txBody>
+      </p:sp>
+      <p:sp>
+        <p:nvSpPr>
+          <p:cNvPr id="3" name="Content Placeholder 2">
+            <a:extLst>
+              <a:ext uri="{FF2B5EF4-FFF2-40B4-BE49-F238E27FC236}">
+                <a16:creationId xmlns:a16="http://schemas.microsoft.com/office/drawing/2014/main" id="{CD2BA280-4419-5963-65FF-B8C64678180C}"/>
+              </a:ext>
+            </a:extLst>
+          </p:cNvPr>
+          <p:cNvSpPr>
+            <a:spLocks noGrp="1"/>
+          </p:cNvSpPr>
+          <p:nvPr>
+            <p:ph idx="1"/>
+          </p:nvPr>
+        </p:nvSpPr>
+        <p:spPr/>
+        <p:txBody>
+          <a:bodyPr/>
+          <a:lstStyle/>
+          <a:p>
+            <a:endParaRPr lang="en-US"/>
+          </a:p>
+        </p:txBody>
+      </p:sp>
+    </p:spTree>
+    <p:extLst>
+      <p:ext uri="{BB962C8B-B14F-4D97-AF65-F5344CB8AC3E}">
+        <p14:creationId xmlns:p14="http://schemas.microsoft.com/office/powerpoint/2010/main" val="4133545569"/>
+      </p:ext>
+    </p:extLst>
+  </p:cSld>
+  <p:clrMapOvr>
+    <a:masterClrMapping/>
+  </p:clrMapOvr>
+</p:sld>
+</file>
+
+<file path=ppt/slides/slide19.xml><?xml version="1.0" encoding="utf-8"?>
+<p:sld xmlns:a="http://schemas.openxmlformats.org/drawingml/2006/main" xmlns:r="http://schemas.openxmlformats.org/officeDocument/2006/relationships" xmlns:p="http://schemas.openxmlformats.org/presentationml/2006/main">
+  <p:cSld>
+    <p:spTree>
+      <p:nvGrpSpPr>
+        <p:cNvPr id="1" name=""/>
+        <p:cNvGrpSpPr/>
+        <p:nvPr/>
+      </p:nvGrpSpPr>
+      <p:grpSpPr>
+        <a:xfrm>
+          <a:off x="0" y="0"/>
+          <a:ext cx="0" cy="0"/>
+          <a:chOff x="0" y="0"/>
+          <a:chExt cx="0" cy="0"/>
+        </a:xfrm>
+      </p:grpSpPr>
+      <p:sp>
+        <p:nvSpPr>
+          <p:cNvPr id="2" name="Title 1">
+            <a:extLst>
+              <a:ext uri="{FF2B5EF4-FFF2-40B4-BE49-F238E27FC236}">
+                <a16:creationId xmlns:a16="http://schemas.microsoft.com/office/drawing/2014/main" id="{A0429577-352F-4953-5101-04B0C941393E}"/>
+              </a:ext>
+            </a:extLst>
+          </p:cNvPr>
+          <p:cNvSpPr>
+            <a:spLocks noGrp="1"/>
+          </p:cNvSpPr>
+          <p:nvPr>
+            <p:ph type="title"/>
+          </p:nvPr>
+        </p:nvSpPr>
+        <p:spPr/>
+        <p:txBody>
+          <a:bodyPr>
+            <a:normAutofit/>
+          </a:bodyPr>
+          <a:lstStyle/>
+          <a:p>
+            <a:r>
+              <a:rPr lang="en-US" b="0" i="0" dirty="0">
+                <a:solidFill>
+                  <a:srgbClr val="374151"/>
+                </a:solidFill>
+                <a:effectLst/>
+                <a:latin typeface="Söhne"/>
+              </a:rPr>
+              <a:t>V. Best practices for using GitHub Actions A. Organizing workflows</a:t>
+            </a:r>
+            <a:endParaRPr lang="en-US" dirty="0"/>
+          </a:p>
+        </p:txBody>
+      </p:sp>
+      <p:sp>
+        <p:nvSpPr>
+          <p:cNvPr id="3" name="Content Placeholder 2">
+            <a:extLst>
+              <a:ext uri="{FF2B5EF4-FFF2-40B4-BE49-F238E27FC236}">
+                <a16:creationId xmlns:a16="http://schemas.microsoft.com/office/drawing/2014/main" id="{E23F5E76-9E7F-FEE1-112F-BE3075685B4B}"/>
+              </a:ext>
+            </a:extLst>
+          </p:cNvPr>
+          <p:cNvSpPr>
+            <a:spLocks noGrp="1"/>
+          </p:cNvSpPr>
+          <p:nvPr>
+            <p:ph idx="1"/>
+          </p:nvPr>
+        </p:nvSpPr>
+        <p:spPr/>
+        <p:txBody>
+          <a:bodyPr/>
+          <a:lstStyle/>
+          <a:p>
+            <a:endParaRPr lang="en-US"/>
+          </a:p>
+        </p:txBody>
+      </p:sp>
+    </p:spTree>
+    <p:extLst>
+      <p:ext uri="{BB962C8B-B14F-4D97-AF65-F5344CB8AC3E}">
+        <p14:creationId xmlns:p14="http://schemas.microsoft.com/office/powerpoint/2010/main" val="544893345"/>
+      </p:ext>
+    </p:extLst>
+  </p:cSld>
+  <p:clrMapOvr>
+    <a:masterClrMapping/>
+  </p:clrMapOvr>
+</p:sld>
+</file>
+
+<file path=ppt/slides/slide2.xml><?xml version="1.0" encoding="utf-8"?>
+<p:sld xmlns:a="http://schemas.openxmlformats.org/drawingml/2006/main" xmlns:r="http://schemas.openxmlformats.org/officeDocument/2006/relationships" xmlns:p="http://schemas.openxmlformats.org/presentationml/2006/main">
+  <p:cSld>
+    <p:bg>
+      <p:bgPr>
+        <a:solidFill>
+          <a:schemeClr val="bg1"/>
+        </a:solidFill>
+        <a:effectLst/>
+      </p:bgPr>
+    </p:bg>
+    <p:spTree>
+      <p:nvGrpSpPr>
+        <p:cNvPr id="1" name=""/>
+        <p:cNvGrpSpPr/>
+        <p:nvPr/>
+      </p:nvGrpSpPr>
+      <p:grpSpPr>
+        <a:xfrm>
+          <a:off x="0" y="0"/>
+          <a:ext cx="0" cy="0"/>
+          <a:chOff x="0" y="0"/>
+          <a:chExt cx="0" cy="0"/>
+        </a:xfrm>
+      </p:grpSpPr>
+      <p:sp>
+        <p:nvSpPr>
+          <p:cNvPr id="10" name="Freeform: Shape 9">
+            <a:extLst>
+              <a:ext uri="{FF2B5EF4-FFF2-40B4-BE49-F238E27FC236}">
+                <a16:creationId xmlns:a16="http://schemas.microsoft.com/office/drawing/2014/main" id="{5CD60141-EEBD-4EC1-8E34-0344C16A18A2}"/>
+              </a:ext>
+              <a:ext uri="{C183D7F6-B498-43B3-948B-1728B52AA6E4}">
+                <adec:decorative xmlns:adec="http://schemas.microsoft.com/office/drawing/2017/decorative" val="1"/>
+              </a:ext>
+            </a:extLst>
+          </p:cNvPr>
+          <p:cNvSpPr>
+            <a:spLocks noGrp="1" noRot="1" noChangeAspect="1" noMove="1" noResize="1" noEditPoints="1" noAdjustHandles="1" noChangeArrowheads="1" noChangeShapeType="1" noTextEdit="1"/>
+          </p:cNvSpPr>
+          <p:nvPr>
+            <p:extLst>
+              <p:ext uri="{386F3935-93C4-4BCD-93E2-E3B085C9AB24}">
+                <p16:designElem xmlns:p16="http://schemas.microsoft.com/office/powerpoint/2015/main" val="1"/>
+              </p:ext>
+            </p:extLst>
+          </p:nvPr>
+        </p:nvSpPr>
+        <p:spPr>
+          <a:xfrm>
+            <a:off x="5318308" y="0"/>
+            <a:ext cx="6873692" cy="6858000"/>
+          </a:xfrm>
+          <a:custGeom>
+            <a:avLst/>
+            <a:gdLst/>
+            <a:ahLst/>
+            <a:cxnLst/>
+            <a:rect l="l" t="t" r="r" b="b"/>
+            <a:pathLst>
+              <a:path w="6873692" h="6858000">
+                <a:moveTo>
+                  <a:pt x="6010592" y="0"/>
+                </a:moveTo>
+                <a:lnTo>
+                  <a:pt x="6873692" y="0"/>
+                </a:lnTo>
+                <a:lnTo>
+                  <a:pt x="6873692" y="6858000"/>
+                </a:lnTo>
+                <a:lnTo>
+                  <a:pt x="0" y="6858000"/>
+                </a:lnTo>
+                <a:lnTo>
+                  <a:pt x="6010589" y="4"/>
+                </a:lnTo>
+                <a:cubicBezTo>
+                  <a:pt x="6010589" y="3"/>
+                  <a:pt x="6010590" y="3"/>
+                  <a:pt x="6010590" y="2"/>
+                </a:cubicBezTo>
+                <a:lnTo>
+                  <a:pt x="6010592" y="0"/>
+                </a:lnTo>
+                <a:close/>
+              </a:path>
+            </a:pathLst>
+          </a:custGeom>
+          <a:solidFill>
+            <a:schemeClr val="bg2"/>
           </a:solidFill>
           <a:ln w="12700" cap="flat" cmpd="sng" algn="ctr">
             <a:noFill/>
@@ -4139,7 +5297,9 @@
           </a:fontRef>
         </p:style>
         <p:txBody>
-          <a:bodyPr rtlCol="0" anchor="ctr"/>
+          <a:bodyPr wrap="square" rtlCol="0" anchor="ctr">
+            <a:noAutofit/>
+          </a:bodyPr>
           <a:lstStyle/>
           <a:p>
             <a:pPr algn="ctr"/>
@@ -4147,10 +5307,573 @@
           </a:p>
         </p:txBody>
       </p:sp>
+      <p:cxnSp>
+        <p:nvCxnSpPr>
+          <p:cNvPr id="12" name="Straight Connector 11">
+            <a:extLst>
+              <a:ext uri="{FF2B5EF4-FFF2-40B4-BE49-F238E27FC236}">
+                <a16:creationId xmlns:a16="http://schemas.microsoft.com/office/drawing/2014/main" id="{4C75A547-BCD1-42BE-966E-53CA0AB93165}"/>
+              </a:ext>
+              <a:ext uri="{C183D7F6-B498-43B3-948B-1728B52AA6E4}">
+                <adec:decorative xmlns:adec="http://schemas.microsoft.com/office/drawing/2017/decorative" val="1"/>
+              </a:ext>
+            </a:extLst>
+          </p:cNvPr>
+          <p:cNvCxnSpPr>
+            <a:cxnSpLocks noGrp="1" noRot="1" noChangeAspect="1" noMove="1" noResize="1" noEditPoints="1" noAdjustHandles="1" noChangeArrowheads="1" noChangeShapeType="1"/>
+          </p:cNvCxnSpPr>
+          <p:nvPr>
+            <p:extLst>
+              <p:ext uri="{386F3935-93C4-4BCD-93E2-E3B085C9AB24}">
+                <p16:designElem xmlns:p16="http://schemas.microsoft.com/office/powerpoint/2015/main" val="1"/>
+              </p:ext>
+            </p:extLst>
+          </p:nvPr>
+        </p:nvCxnSpPr>
+        <p:spPr>
+          <a:xfrm>
+            <a:off x="1188357" y="5151666"/>
+            <a:ext cx="9822543" cy="0"/>
+          </a:xfrm>
+          <a:prstGeom prst="line">
+            <a:avLst/>
+          </a:prstGeom>
+          <a:ln w="12700">
+            <a:solidFill>
+              <a:schemeClr val="tx1"/>
+            </a:solidFill>
+          </a:ln>
+        </p:spPr>
+        <p:style>
+          <a:lnRef idx="1">
+            <a:schemeClr val="accent1"/>
+          </a:lnRef>
+          <a:fillRef idx="0">
+            <a:schemeClr val="accent1"/>
+          </a:fillRef>
+          <a:effectRef idx="0">
+            <a:schemeClr val="accent1"/>
+          </a:effectRef>
+          <a:fontRef idx="minor">
+            <a:schemeClr val="tx1"/>
+          </a:fontRef>
+        </p:style>
+      </p:cxnSp>
+      <p:sp useBgFill="1">
+        <p:nvSpPr>
+          <p:cNvPr id="14" name="Rectangle 13">
+            <a:extLst>
+              <a:ext uri="{FF2B5EF4-FFF2-40B4-BE49-F238E27FC236}">
+                <a16:creationId xmlns:a16="http://schemas.microsoft.com/office/drawing/2014/main" id="{C3B0A228-9EA3-4009-A82E-9402BBC726A0}"/>
+              </a:ext>
+              <a:ext uri="{C183D7F6-B498-43B3-948B-1728B52AA6E4}">
+                <adec:decorative xmlns:adec="http://schemas.microsoft.com/office/drawing/2017/decorative" val="1"/>
+              </a:ext>
+            </a:extLst>
+          </p:cNvPr>
+          <p:cNvSpPr>
+            <a:spLocks noGrp="1" noRot="1" noChangeAspect="1" noMove="1" noResize="1" noEditPoints="1" noAdjustHandles="1" noChangeArrowheads="1" noChangeShapeType="1" noTextEdit="1"/>
+          </p:cNvSpPr>
+          <p:nvPr>
+            <p:extLst>
+              <p:ext uri="{386F3935-93C4-4BCD-93E2-E3B085C9AB24}">
+                <p16:designElem xmlns:p16="http://schemas.microsoft.com/office/powerpoint/2015/main" val="1"/>
+              </p:ext>
+            </p:extLst>
+          </p:nvPr>
+        </p:nvSpPr>
+        <p:spPr>
+          <a:xfrm>
+            <a:off x="0" y="0"/>
+            <a:ext cx="12192000" cy="6858000"/>
+          </a:xfrm>
+          <a:prstGeom prst="rect">
+            <a:avLst/>
+          </a:prstGeom>
+          <a:ln w="12700" cap="flat" cmpd="sng" algn="ctr">
+            <a:noFill/>
+            <a:prstDash val="solid"/>
+            <a:miter lim="800000"/>
+          </a:ln>
+          <a:effectLst/>
+          <a:extLst>
+            <a:ext uri="{91240B29-F687-4F45-9708-019B960494DF}">
+              <a14:hiddenLine xmlns:a14="http://schemas.microsoft.com/office/drawing/2010/main" w="12700" cap="flat" cmpd="sng" algn="ctr">
+                <a:solidFill>
+                  <a:schemeClr val="accent1">
+                    <a:shade val="50000"/>
+                  </a:schemeClr>
+                </a:solidFill>
+                <a:prstDash val="solid"/>
+                <a:miter lim="800000"/>
+              </a14:hiddenLine>
+            </a:ext>
+          </a:extLst>
+        </p:spPr>
+        <p:style>
+          <a:lnRef idx="2">
+            <a:schemeClr val="accent1">
+              <a:shade val="50000"/>
+            </a:schemeClr>
+          </a:lnRef>
+          <a:fillRef idx="1">
+            <a:schemeClr val="accent1"/>
+          </a:fillRef>
+          <a:effectRef idx="0">
+            <a:schemeClr val="accent1"/>
+          </a:effectRef>
+          <a:fontRef idx="minor">
+            <a:schemeClr val="lt1"/>
+          </a:fontRef>
+        </p:style>
+        <p:txBody>
+          <a:bodyPr rtlCol="0" anchor="ctr"/>
+          <a:lstStyle/>
+          <a:p>
+            <a:pPr algn="ctr"/>
+            <a:endParaRPr lang="en-US"/>
+          </a:p>
+        </p:txBody>
+      </p:sp>
+      <p:sp>
+        <p:nvSpPr>
+          <p:cNvPr id="16" name="Freeform: Shape 15">
+            <a:extLst>
+              <a:ext uri="{FF2B5EF4-FFF2-40B4-BE49-F238E27FC236}">
+                <a16:creationId xmlns:a16="http://schemas.microsoft.com/office/drawing/2014/main" id="{3376605B-B311-4691-9B2A-1684D1F5FEEF}"/>
+              </a:ext>
+              <a:ext uri="{C183D7F6-B498-43B3-948B-1728B52AA6E4}">
+                <adec:decorative xmlns:adec="http://schemas.microsoft.com/office/drawing/2017/decorative" val="1"/>
+              </a:ext>
+            </a:extLst>
+          </p:cNvPr>
+          <p:cNvSpPr>
+            <a:spLocks noGrp="1" noRot="1" noChangeAspect="1" noMove="1" noResize="1" noEditPoints="1" noAdjustHandles="1" noChangeArrowheads="1" noChangeShapeType="1" noTextEdit="1"/>
+          </p:cNvSpPr>
+          <p:nvPr>
+            <p:extLst>
+              <p:ext uri="{386F3935-93C4-4BCD-93E2-E3B085C9AB24}">
+                <p16:designElem xmlns:p16="http://schemas.microsoft.com/office/powerpoint/2015/main" val="1"/>
+              </p:ext>
+            </p:extLst>
+          </p:nvPr>
+        </p:nvSpPr>
+        <p:spPr>
+          <a:xfrm rot="16200000" flipH="1" flipV="1">
+            <a:off x="1127553" y="-1127553"/>
+            <a:ext cx="6858000" cy="9113106"/>
+          </a:xfrm>
+          <a:custGeom>
+            <a:avLst/>
+            <a:gdLst>
+              <a:gd name="connsiteX0" fmla="*/ 0 w 6858000"/>
+              <a:gd name="connsiteY0" fmla="*/ 7143270 h 9113106"/>
+              <a:gd name="connsiteX1" fmla="*/ 0 w 6858000"/>
+              <a:gd name="connsiteY1" fmla="*/ 6878623 h 9113106"/>
+              <a:gd name="connsiteX2" fmla="*/ 1 w 6858000"/>
+              <a:gd name="connsiteY2" fmla="*/ 6878623 h 9113106"/>
+              <a:gd name="connsiteX3" fmla="*/ 0 w 6858000"/>
+              <a:gd name="connsiteY3" fmla="*/ 4319945 h 9113106"/>
+              <a:gd name="connsiteX4" fmla="*/ 1 w 6858000"/>
+              <a:gd name="connsiteY4" fmla="*/ 4319945 h 9113106"/>
+              <a:gd name="connsiteX5" fmla="*/ 1 w 6858000"/>
+              <a:gd name="connsiteY5" fmla="*/ 13542 h 9113106"/>
+              <a:gd name="connsiteX6" fmla="*/ 0 w 6858000"/>
+              <a:gd name="connsiteY6" fmla="*/ 13540 h 9113106"/>
+              <a:gd name="connsiteX7" fmla="*/ 0 w 6858000"/>
+              <a:gd name="connsiteY7" fmla="*/ 0 h 9113106"/>
+              <a:gd name="connsiteX8" fmla="*/ 6858000 w 6858000"/>
+              <a:gd name="connsiteY8" fmla="*/ 6010591 h 9113106"/>
+              <a:gd name="connsiteX9" fmla="*/ 6858000 w 6858000"/>
+              <a:gd name="connsiteY9" fmla="*/ 3794798 h 9113106"/>
+              <a:gd name="connsiteX10" fmla="*/ 6858000 w 6858000"/>
+              <a:gd name="connsiteY10" fmla="*/ 3794798 h 9113106"/>
+              <a:gd name="connsiteX11" fmla="*/ 6858000 w 6858000"/>
+              <a:gd name="connsiteY11" fmla="*/ 3837120 h 9113106"/>
+              <a:gd name="connsiteX12" fmla="*/ 6858000 w 6858000"/>
+              <a:gd name="connsiteY12" fmla="*/ 6838049 h 9113106"/>
+              <a:gd name="connsiteX13" fmla="*/ 6858000 w 6858000"/>
+              <a:gd name="connsiteY13" fmla="*/ 9113106 h 9113106"/>
+              <a:gd name="connsiteX14" fmla="*/ 1 w 6858000"/>
+              <a:gd name="connsiteY14" fmla="*/ 9113106 h 9113106"/>
+              <a:gd name="connsiteX15" fmla="*/ 1 w 6858000"/>
+              <a:gd name="connsiteY15" fmla="*/ 7143270 h 9113106"/>
+            </a:gdLst>
+            <a:ahLst/>
+            <a:cxnLst>
+              <a:cxn ang="0">
+                <a:pos x="connsiteX0" y="connsiteY0"/>
+              </a:cxn>
+              <a:cxn ang="0">
+                <a:pos x="connsiteX1" y="connsiteY1"/>
+              </a:cxn>
+              <a:cxn ang="0">
+                <a:pos x="connsiteX2" y="connsiteY2"/>
+              </a:cxn>
+              <a:cxn ang="0">
+                <a:pos x="connsiteX3" y="connsiteY3"/>
+              </a:cxn>
+              <a:cxn ang="0">
+                <a:pos x="connsiteX4" y="connsiteY4"/>
+              </a:cxn>
+              <a:cxn ang="0">
+                <a:pos x="connsiteX5" y="connsiteY5"/>
+              </a:cxn>
+              <a:cxn ang="0">
+                <a:pos x="connsiteX6" y="connsiteY6"/>
+              </a:cxn>
+              <a:cxn ang="0">
+                <a:pos x="connsiteX7" y="connsiteY7"/>
+              </a:cxn>
+              <a:cxn ang="0">
+                <a:pos x="connsiteX8" y="connsiteY8"/>
+              </a:cxn>
+              <a:cxn ang="0">
+                <a:pos x="connsiteX9" y="connsiteY9"/>
+              </a:cxn>
+              <a:cxn ang="0">
+                <a:pos x="connsiteX10" y="connsiteY10"/>
+              </a:cxn>
+              <a:cxn ang="0">
+                <a:pos x="connsiteX11" y="connsiteY11"/>
+              </a:cxn>
+              <a:cxn ang="0">
+                <a:pos x="connsiteX12" y="connsiteY12"/>
+              </a:cxn>
+              <a:cxn ang="0">
+                <a:pos x="connsiteX13" y="connsiteY13"/>
+              </a:cxn>
+              <a:cxn ang="0">
+                <a:pos x="connsiteX14" y="connsiteY14"/>
+              </a:cxn>
+              <a:cxn ang="0">
+                <a:pos x="connsiteX15" y="connsiteY15"/>
+              </a:cxn>
+            </a:cxnLst>
+            <a:rect l="l" t="t" r="r" b="b"/>
+            <a:pathLst>
+              <a:path w="6858000" h="9113106">
+                <a:moveTo>
+                  <a:pt x="0" y="7143270"/>
+                </a:moveTo>
+                <a:lnTo>
+                  <a:pt x="0" y="6878623"/>
+                </a:lnTo>
+                <a:lnTo>
+                  <a:pt x="1" y="6878623"/>
+                </a:lnTo>
+                <a:lnTo>
+                  <a:pt x="0" y="4319945"/>
+                </a:lnTo>
+                <a:lnTo>
+                  <a:pt x="1" y="4319945"/>
+                </a:lnTo>
+                <a:lnTo>
+                  <a:pt x="1" y="13542"/>
+                </a:lnTo>
+                <a:lnTo>
+                  <a:pt x="0" y="13540"/>
+                </a:lnTo>
+                <a:lnTo>
+                  <a:pt x="0" y="0"/>
+                </a:lnTo>
+                <a:lnTo>
+                  <a:pt x="6858000" y="6010591"/>
+                </a:lnTo>
+                <a:lnTo>
+                  <a:pt x="6858000" y="3794798"/>
+                </a:lnTo>
+                <a:lnTo>
+                  <a:pt x="6858000" y="3794798"/>
+                </a:lnTo>
+                <a:lnTo>
+                  <a:pt x="6858000" y="3837120"/>
+                </a:lnTo>
+                <a:lnTo>
+                  <a:pt x="6858000" y="6838049"/>
+                </a:lnTo>
+                <a:lnTo>
+                  <a:pt x="6858000" y="9113106"/>
+                </a:lnTo>
+                <a:lnTo>
+                  <a:pt x="1" y="9113106"/>
+                </a:lnTo>
+                <a:lnTo>
+                  <a:pt x="1" y="7143270"/>
+                </a:lnTo>
+                <a:close/>
+              </a:path>
+            </a:pathLst>
+          </a:custGeom>
+          <a:solidFill>
+            <a:schemeClr val="bg2"/>
+          </a:solidFill>
+          <a:ln>
+            <a:noFill/>
+          </a:ln>
+        </p:spPr>
+        <p:style>
+          <a:lnRef idx="2">
+            <a:schemeClr val="accent1">
+              <a:shade val="50000"/>
+            </a:schemeClr>
+          </a:lnRef>
+          <a:fillRef idx="1">
+            <a:schemeClr val="accent1"/>
+          </a:fillRef>
+          <a:effectRef idx="0">
+            <a:schemeClr val="accent1"/>
+          </a:effectRef>
+          <a:fontRef idx="minor">
+            <a:schemeClr val="lt1"/>
+          </a:fontRef>
+        </p:style>
+        <p:txBody>
+          <a:bodyPr wrap="square" rtlCol="0" anchor="ctr">
+            <a:noAutofit/>
+          </a:bodyPr>
+          <a:lstStyle/>
+          <a:p>
+            <a:pPr algn="ctr"/>
+            <a:endParaRPr lang="en-US"/>
+          </a:p>
+        </p:txBody>
+      </p:sp>
+      <p:sp>
+        <p:nvSpPr>
+          <p:cNvPr id="18" name="Freeform: Shape 17">
+            <a:extLst>
+              <a:ext uri="{FF2B5EF4-FFF2-40B4-BE49-F238E27FC236}">
+                <a16:creationId xmlns:a16="http://schemas.microsoft.com/office/drawing/2014/main" id="{50C40FC6-F06C-437F-A877-019DFC43FCFC}"/>
+              </a:ext>
+              <a:ext uri="{C183D7F6-B498-43B3-948B-1728B52AA6E4}">
+                <adec:decorative xmlns:adec="http://schemas.microsoft.com/office/drawing/2017/decorative" val="1"/>
+              </a:ext>
+            </a:extLst>
+          </p:cNvPr>
+          <p:cNvSpPr>
+            <a:spLocks noGrp="1" noRot="1" noChangeAspect="1" noMove="1" noResize="1" noEditPoints="1" noAdjustHandles="1" noChangeArrowheads="1" noChangeShapeType="1" noTextEdit="1"/>
+          </p:cNvSpPr>
+          <p:nvPr>
+            <p:extLst>
+              <p:ext uri="{386F3935-93C4-4BCD-93E2-E3B085C9AB24}">
+                <p16:designElem xmlns:p16="http://schemas.microsoft.com/office/powerpoint/2015/main" val="1"/>
+              </p:ext>
+            </p:extLst>
+          </p:nvPr>
+        </p:nvSpPr>
+        <p:spPr>
+          <a:xfrm>
+            <a:off x="2234482" y="0"/>
+            <a:ext cx="9957519" cy="6858000"/>
+          </a:xfrm>
+          <a:custGeom>
+            <a:avLst/>
+            <a:gdLst>
+              <a:gd name="connsiteX0" fmla="*/ 6878624 w 9957519"/>
+              <a:gd name="connsiteY0" fmla="*/ 0 h 6858000"/>
+              <a:gd name="connsiteX1" fmla="*/ 9957519 w 9957519"/>
+              <a:gd name="connsiteY1" fmla="*/ 0 h 6858000"/>
+              <a:gd name="connsiteX2" fmla="*/ 9957519 w 9957519"/>
+              <a:gd name="connsiteY2" fmla="*/ 1557082 h 6858000"/>
+              <a:gd name="connsiteX3" fmla="*/ 5311608 w 9957519"/>
+              <a:gd name="connsiteY3" fmla="*/ 6858000 h 6858000"/>
+              <a:gd name="connsiteX4" fmla="*/ 868032 w 9957519"/>
+              <a:gd name="connsiteY4" fmla="*/ 6858000 h 6858000"/>
+              <a:gd name="connsiteX5" fmla="*/ 0 w 9957519"/>
+              <a:gd name="connsiteY5" fmla="*/ 0 h 6858000"/>
+              <a:gd name="connsiteX6" fmla="*/ 6878624 w 9957519"/>
+              <a:gd name="connsiteY6" fmla="*/ 0 h 6858000"/>
+              <a:gd name="connsiteX7" fmla="*/ 0 w 9957519"/>
+              <a:gd name="connsiteY7" fmla="*/ 1 h 6858000"/>
+            </a:gdLst>
+            <a:ahLst/>
+            <a:cxnLst>
+              <a:cxn ang="0">
+                <a:pos x="connsiteX0" y="connsiteY0"/>
+              </a:cxn>
+              <a:cxn ang="0">
+                <a:pos x="connsiteX1" y="connsiteY1"/>
+              </a:cxn>
+              <a:cxn ang="0">
+                <a:pos x="connsiteX2" y="connsiteY2"/>
+              </a:cxn>
+              <a:cxn ang="0">
+                <a:pos x="connsiteX3" y="connsiteY3"/>
+              </a:cxn>
+              <a:cxn ang="0">
+                <a:pos x="connsiteX4" y="connsiteY4"/>
+              </a:cxn>
+              <a:cxn ang="0">
+                <a:pos x="connsiteX5" y="connsiteY5"/>
+              </a:cxn>
+              <a:cxn ang="0">
+                <a:pos x="connsiteX6" y="connsiteY6"/>
+              </a:cxn>
+              <a:cxn ang="0">
+                <a:pos x="connsiteX7" y="connsiteY7"/>
+              </a:cxn>
+            </a:cxnLst>
+            <a:rect l="l" t="t" r="r" b="b"/>
+            <a:pathLst>
+              <a:path w="9957519" h="6858000">
+                <a:moveTo>
+                  <a:pt x="6878624" y="0"/>
+                </a:moveTo>
+                <a:lnTo>
+                  <a:pt x="9957519" y="0"/>
+                </a:lnTo>
+                <a:lnTo>
+                  <a:pt x="9957519" y="1557082"/>
+                </a:lnTo>
+                <a:lnTo>
+                  <a:pt x="5311608" y="6858000"/>
+                </a:lnTo>
+                <a:lnTo>
+                  <a:pt x="868032" y="6858000"/>
+                </a:lnTo>
+                <a:close/>
+                <a:moveTo>
+                  <a:pt x="0" y="0"/>
+                </a:moveTo>
+                <a:lnTo>
+                  <a:pt x="6878624" y="0"/>
+                </a:lnTo>
+                <a:lnTo>
+                  <a:pt x="0" y="1"/>
+                </a:lnTo>
+                <a:close/>
+              </a:path>
+            </a:pathLst>
+          </a:custGeom>
+          <a:solidFill>
+            <a:srgbClr val="FFFFFF"/>
+          </a:solidFill>
+          <a:ln w="12700" cap="flat" cmpd="sng" algn="ctr">
+            <a:noFill/>
+            <a:prstDash val="solid"/>
+            <a:miter lim="800000"/>
+          </a:ln>
+          <a:effectLst/>
+        </p:spPr>
+        <p:style>
+          <a:lnRef idx="2">
+            <a:schemeClr val="accent1">
+              <a:shade val="50000"/>
+            </a:schemeClr>
+          </a:lnRef>
+          <a:fillRef idx="1">
+            <a:schemeClr val="accent1"/>
+          </a:fillRef>
+          <a:effectRef idx="0">
+            <a:schemeClr val="accent1"/>
+          </a:effectRef>
+          <a:fontRef idx="minor">
+            <a:schemeClr val="lt1"/>
+          </a:fontRef>
+        </p:style>
+        <p:txBody>
+          <a:bodyPr wrap="square" rtlCol="0" anchor="ctr">
+            <a:noAutofit/>
+          </a:bodyPr>
+          <a:lstStyle/>
+          <a:p>
+            <a:pPr algn="ctr"/>
+            <a:endParaRPr lang="en-US"/>
+          </a:p>
+        </p:txBody>
+      </p:sp>
+      <p:sp>
+        <p:nvSpPr>
+          <p:cNvPr id="2" name="Title 1">
+            <a:extLst>
+              <a:ext uri="{FF2B5EF4-FFF2-40B4-BE49-F238E27FC236}">
+                <a16:creationId xmlns:a16="http://schemas.microsoft.com/office/drawing/2014/main" id="{8FD82175-DAFD-125F-6EA1-18D831F4293C}"/>
+              </a:ext>
+            </a:extLst>
+          </p:cNvPr>
+          <p:cNvSpPr>
+            <a:spLocks noGrp="1"/>
+          </p:cNvSpPr>
+          <p:nvPr>
+            <p:ph type="title"/>
+          </p:nvPr>
+        </p:nvSpPr>
+        <p:spPr>
+          <a:xfrm>
+            <a:off x="1143000" y="1181101"/>
+            <a:ext cx="5202381" cy="1998517"/>
+          </a:xfrm>
+        </p:spPr>
+        <p:txBody>
+          <a:bodyPr vert="horz" lIns="91440" tIns="45720" rIns="91440" bIns="45720" rtlCol="0" anchor="t">
+            <a:normAutofit/>
+          </a:bodyPr>
+          <a:lstStyle/>
+          <a:p>
+            <a:pPr>
+              <a:lnSpc>
+                <a:spcPct val="90000"/>
+              </a:lnSpc>
+            </a:pPr>
+            <a:r>
+              <a:rPr lang="en-US" sz="3400" b="0" i="0" cap="all" spc="300" dirty="0">
+                <a:effectLst/>
+              </a:rPr>
+              <a:t>Definition of GitHub Actions</a:t>
+            </a:r>
+            <a:br>
+              <a:rPr lang="en-US" sz="3400" b="0" i="0" cap="all" spc="300" dirty="0">
+                <a:effectLst/>
+              </a:rPr>
+            </a:br>
+            <a:endParaRPr lang="en-US" sz="3400" cap="all" spc="300" dirty="0"/>
+          </a:p>
+        </p:txBody>
+      </p:sp>
+      <p:pic>
+        <p:nvPicPr>
+          <p:cNvPr id="7" name="Graphic 6" descr="Checkmark">
+            <a:extLst>
+              <a:ext uri="{FF2B5EF4-FFF2-40B4-BE49-F238E27FC236}">
+                <a16:creationId xmlns:a16="http://schemas.microsoft.com/office/drawing/2014/main" id="{0E02D414-E3CF-5BB0-7886-678DFEE3C653}"/>
+              </a:ext>
+            </a:extLst>
+          </p:cNvPr>
+          <p:cNvPicPr>
+            <a:picLocks noChangeAspect="1"/>
+          </p:cNvPicPr>
+          <p:nvPr/>
+        </p:nvPicPr>
+        <p:blipFill>
+          <a:blip r:embed="rId2">
+            <a:extLst>
+              <a:ext uri="{28A0092B-C50C-407E-A947-70E740481C1C}">
+                <a14:useLocalDpi xmlns:a14="http://schemas.microsoft.com/office/drawing/2010/main" val="0"/>
+              </a:ext>
+              <a:ext uri="{96DAC541-7B7A-43D3-8B79-37D633B846F1}">
+                <asvg:svgBlip xmlns:asvg="http://schemas.microsoft.com/office/drawing/2016/SVG/main" r:embed="rId3"/>
+              </a:ext>
+            </a:extLst>
+          </a:blip>
+          <a:stretch>
+            <a:fillRect/>
+          </a:stretch>
+        </p:blipFill>
+        <p:spPr>
+          <a:xfrm>
+            <a:off x="7408054" y="2754999"/>
+            <a:ext cx="1640019" cy="1640019"/>
+          </a:xfrm>
+          <a:prstGeom prst="rect">
+            <a:avLst/>
+          </a:prstGeom>
+        </p:spPr>
+      </p:pic>
     </p:spTree>
     <p:extLst>
       <p:ext uri="{BB962C8B-B14F-4D97-AF65-F5344CB8AC3E}">
-        <p14:creationId xmlns:p14="http://schemas.microsoft.com/office/powerpoint/2010/main" val="2757586524"/>
+        <p14:creationId xmlns:p14="http://schemas.microsoft.com/office/powerpoint/2010/main" val="2235108412"/>
       </p:ext>
     </p:extLst>
   </p:cSld>
@@ -4160,7 +5883,7 @@
 </p:sld>
 </file>
 
-<file path=ppt/slides/slide2.xml><?xml version="1.0" encoding="utf-8"?>
+<file path=ppt/slides/slide20.xml><?xml version="1.0" encoding="utf-8"?>
 <p:sld xmlns:a="http://schemas.openxmlformats.org/drawingml/2006/main" xmlns:r="http://schemas.openxmlformats.org/officeDocument/2006/relationships" xmlns:p="http://schemas.openxmlformats.org/presentationml/2006/main">
   <p:cSld>
     <p:spTree>
@@ -4182,7 +5905,7 @@
           <p:cNvPr id="2" name="Title 1">
             <a:extLst>
               <a:ext uri="{FF2B5EF4-FFF2-40B4-BE49-F238E27FC236}">
-                <a16:creationId xmlns:a16="http://schemas.microsoft.com/office/drawing/2014/main" id="{990EC855-C78F-BA6F-F63E-BD4191781BAC}"/>
+                <a16:creationId xmlns:a16="http://schemas.microsoft.com/office/drawing/2014/main" id="{B8DA0793-FC22-F1D7-D985-90296CE04750}"/>
               </a:ext>
             </a:extLst>
           </p:cNvPr>
@@ -4195,13 +5918,31 @@
         </p:nvSpPr>
         <p:spPr/>
         <p:txBody>
-          <a:bodyPr/>
-          <a:lstStyle/>
-          <a:p>
-            <a:r>
-              <a:rPr lang="en-US" dirty="0"/>
-              <a:t>Ideation</a:t>
-            </a:r>
+          <a:bodyPr>
+            <a:normAutofit/>
+          </a:bodyPr>
+          <a:lstStyle/>
+          <a:p>
+            <a:r>
+              <a:rPr lang="en-US" b="0" i="0" dirty="0">
+                <a:solidFill>
+                  <a:srgbClr val="374151"/>
+                </a:solidFill>
+                <a:effectLst/>
+                <a:latin typeface="Söhne"/>
+              </a:rPr>
+              <a:t>B. Securing workflows</a:t>
+            </a:r>
+            <a:br>
+              <a:rPr lang="en-US" b="0" i="0" dirty="0">
+                <a:solidFill>
+                  <a:srgbClr val="374151"/>
+                </a:solidFill>
+                <a:effectLst/>
+                <a:latin typeface="Söhne"/>
+              </a:rPr>
+            </a:br>
+            <a:endParaRPr lang="en-US" dirty="0"/>
           </a:p>
         </p:txBody>
       </p:sp>
@@ -4210,7 +5951,7 @@
           <p:cNvPr id="3" name="Content Placeholder 2">
             <a:extLst>
               <a:ext uri="{FF2B5EF4-FFF2-40B4-BE49-F238E27FC236}">
-                <a16:creationId xmlns:a16="http://schemas.microsoft.com/office/drawing/2014/main" id="{92F3A777-3A5D-E95A-1E82-48B68742BA8A}"/>
+                <a16:creationId xmlns:a16="http://schemas.microsoft.com/office/drawing/2014/main" id="{C376AEA1-442B-8E8D-C5CE-2AFFAE5437D3}"/>
               </a:ext>
             </a:extLst>
           </p:cNvPr>
@@ -4233,7 +5974,1199 @@
     </p:spTree>
     <p:extLst>
       <p:ext uri="{BB962C8B-B14F-4D97-AF65-F5344CB8AC3E}">
-        <p14:creationId xmlns:p14="http://schemas.microsoft.com/office/powerpoint/2010/main" val="3837540262"/>
+        <p14:creationId xmlns:p14="http://schemas.microsoft.com/office/powerpoint/2010/main" val="3832965227"/>
+      </p:ext>
+    </p:extLst>
+  </p:cSld>
+  <p:clrMapOvr>
+    <a:masterClrMapping/>
+  </p:clrMapOvr>
+</p:sld>
+</file>
+
+<file path=ppt/slides/slide21.xml><?xml version="1.0" encoding="utf-8"?>
+<p:sld xmlns:a="http://schemas.openxmlformats.org/drawingml/2006/main" xmlns:r="http://schemas.openxmlformats.org/officeDocument/2006/relationships" xmlns:p="http://schemas.openxmlformats.org/presentationml/2006/main">
+  <p:cSld>
+    <p:spTree>
+      <p:nvGrpSpPr>
+        <p:cNvPr id="1" name=""/>
+        <p:cNvGrpSpPr/>
+        <p:nvPr/>
+      </p:nvGrpSpPr>
+      <p:grpSpPr>
+        <a:xfrm>
+          <a:off x="0" y="0"/>
+          <a:ext cx="0" cy="0"/>
+          <a:chOff x="0" y="0"/>
+          <a:chExt cx="0" cy="0"/>
+        </a:xfrm>
+      </p:grpSpPr>
+      <p:sp>
+        <p:nvSpPr>
+          <p:cNvPr id="2" name="Title 1">
+            <a:extLst>
+              <a:ext uri="{FF2B5EF4-FFF2-40B4-BE49-F238E27FC236}">
+                <a16:creationId xmlns:a16="http://schemas.microsoft.com/office/drawing/2014/main" id="{C20B8F48-D522-B0B2-881E-A75931E3FC1A}"/>
+              </a:ext>
+            </a:extLst>
+          </p:cNvPr>
+          <p:cNvSpPr>
+            <a:spLocks noGrp="1"/>
+          </p:cNvSpPr>
+          <p:nvPr>
+            <p:ph type="title"/>
+          </p:nvPr>
+        </p:nvSpPr>
+        <p:spPr/>
+        <p:txBody>
+          <a:bodyPr/>
+          <a:lstStyle/>
+          <a:p>
+            <a:r>
+              <a:rPr lang="en-US" b="0" i="0" dirty="0">
+                <a:solidFill>
+                  <a:srgbClr val="374151"/>
+                </a:solidFill>
+                <a:effectLst/>
+                <a:latin typeface="Söhne"/>
+              </a:rPr>
+              <a:t>C. Testing workflows</a:t>
+            </a:r>
+            <a:endParaRPr lang="en-US" dirty="0"/>
+          </a:p>
+        </p:txBody>
+      </p:sp>
+      <p:sp>
+        <p:nvSpPr>
+          <p:cNvPr id="3" name="Content Placeholder 2">
+            <a:extLst>
+              <a:ext uri="{FF2B5EF4-FFF2-40B4-BE49-F238E27FC236}">
+                <a16:creationId xmlns:a16="http://schemas.microsoft.com/office/drawing/2014/main" id="{E5387224-FE70-8434-A8C9-0378A4AB19CA}"/>
+              </a:ext>
+            </a:extLst>
+          </p:cNvPr>
+          <p:cNvSpPr>
+            <a:spLocks noGrp="1"/>
+          </p:cNvSpPr>
+          <p:nvPr>
+            <p:ph idx="1"/>
+          </p:nvPr>
+        </p:nvSpPr>
+        <p:spPr/>
+        <p:txBody>
+          <a:bodyPr/>
+          <a:lstStyle/>
+          <a:p>
+            <a:endParaRPr lang="en-US"/>
+          </a:p>
+        </p:txBody>
+      </p:sp>
+    </p:spTree>
+    <p:extLst>
+      <p:ext uri="{BB962C8B-B14F-4D97-AF65-F5344CB8AC3E}">
+        <p14:creationId xmlns:p14="http://schemas.microsoft.com/office/powerpoint/2010/main" val="374111286"/>
+      </p:ext>
+    </p:extLst>
+  </p:cSld>
+  <p:clrMapOvr>
+    <a:masterClrMapping/>
+  </p:clrMapOvr>
+</p:sld>
+</file>
+
+<file path=ppt/slides/slide22.xml><?xml version="1.0" encoding="utf-8"?>
+<p:sld xmlns:a="http://schemas.openxmlformats.org/drawingml/2006/main" xmlns:r="http://schemas.openxmlformats.org/officeDocument/2006/relationships" xmlns:p="http://schemas.openxmlformats.org/presentationml/2006/main">
+  <p:cSld>
+    <p:spTree>
+      <p:nvGrpSpPr>
+        <p:cNvPr id="1" name=""/>
+        <p:cNvGrpSpPr/>
+        <p:nvPr/>
+      </p:nvGrpSpPr>
+      <p:grpSpPr>
+        <a:xfrm>
+          <a:off x="0" y="0"/>
+          <a:ext cx="0" cy="0"/>
+          <a:chOff x="0" y="0"/>
+          <a:chExt cx="0" cy="0"/>
+        </a:xfrm>
+      </p:grpSpPr>
+      <p:sp>
+        <p:nvSpPr>
+          <p:cNvPr id="2" name="Title 1">
+            <a:extLst>
+              <a:ext uri="{FF2B5EF4-FFF2-40B4-BE49-F238E27FC236}">
+                <a16:creationId xmlns:a16="http://schemas.microsoft.com/office/drawing/2014/main" id="{8A33D24D-87EA-A7BB-82F3-B14B287B8CCD}"/>
+              </a:ext>
+            </a:extLst>
+          </p:cNvPr>
+          <p:cNvSpPr>
+            <a:spLocks noGrp="1"/>
+          </p:cNvSpPr>
+          <p:nvPr>
+            <p:ph type="title"/>
+          </p:nvPr>
+        </p:nvSpPr>
+        <p:spPr/>
+        <p:txBody>
+          <a:bodyPr/>
+          <a:lstStyle/>
+          <a:p>
+            <a:r>
+              <a:rPr lang="en-US" b="0" i="0" dirty="0">
+                <a:solidFill>
+                  <a:srgbClr val="374151"/>
+                </a:solidFill>
+                <a:effectLst/>
+                <a:latin typeface="Söhne"/>
+              </a:rPr>
+              <a:t>D. Reviewing workflow changes</a:t>
+            </a:r>
+            <a:endParaRPr lang="en-US" dirty="0"/>
+          </a:p>
+        </p:txBody>
+      </p:sp>
+      <p:sp>
+        <p:nvSpPr>
+          <p:cNvPr id="3" name="Content Placeholder 2">
+            <a:extLst>
+              <a:ext uri="{FF2B5EF4-FFF2-40B4-BE49-F238E27FC236}">
+                <a16:creationId xmlns:a16="http://schemas.microsoft.com/office/drawing/2014/main" id="{172B9BE4-1D4C-6C08-4563-FE3955F7B00B}"/>
+              </a:ext>
+            </a:extLst>
+          </p:cNvPr>
+          <p:cNvSpPr>
+            <a:spLocks noGrp="1"/>
+          </p:cNvSpPr>
+          <p:nvPr>
+            <p:ph idx="1"/>
+          </p:nvPr>
+        </p:nvSpPr>
+        <p:spPr/>
+        <p:txBody>
+          <a:bodyPr/>
+          <a:lstStyle/>
+          <a:p>
+            <a:endParaRPr lang="en-US"/>
+          </a:p>
+        </p:txBody>
+      </p:sp>
+      <p:sp>
+        <p:nvSpPr>
+          <p:cNvPr id="5" name="TextBox 4">
+            <a:extLst>
+              <a:ext uri="{FF2B5EF4-FFF2-40B4-BE49-F238E27FC236}">
+                <a16:creationId xmlns:a16="http://schemas.microsoft.com/office/drawing/2014/main" id="{0D09AA70-14E5-22AD-8925-3EE3E57A797D}"/>
+              </a:ext>
+            </a:extLst>
+          </p:cNvPr>
+          <p:cNvSpPr txBox="1"/>
+          <p:nvPr/>
+        </p:nvSpPr>
+        <p:spPr>
+          <a:xfrm>
+            <a:off x="3048856" y="3246902"/>
+            <a:ext cx="6097712" cy="369332"/>
+          </a:xfrm>
+          <a:prstGeom prst="rect">
+            <a:avLst/>
+          </a:prstGeom>
+          <a:noFill/>
+        </p:spPr>
+        <p:txBody>
+          <a:bodyPr wrap="square">
+            <a:spAutoFit/>
+          </a:bodyPr>
+          <a:lstStyle/>
+          <a:p>
+            <a:r>
+              <a:rPr lang="en-US" b="0" i="0" dirty="0">
+                <a:solidFill>
+                  <a:srgbClr val="374151"/>
+                </a:solidFill>
+                <a:effectLst/>
+                <a:latin typeface="Söhne"/>
+              </a:rPr>
+              <a:t>D. Reviewing workflow changes</a:t>
+            </a:r>
+            <a:endParaRPr lang="en-US" dirty="0"/>
+          </a:p>
+        </p:txBody>
+      </p:sp>
+    </p:spTree>
+    <p:extLst>
+      <p:ext uri="{BB962C8B-B14F-4D97-AF65-F5344CB8AC3E}">
+        <p14:creationId xmlns:p14="http://schemas.microsoft.com/office/powerpoint/2010/main" val="658796248"/>
+      </p:ext>
+    </p:extLst>
+  </p:cSld>
+  <p:clrMapOvr>
+    <a:masterClrMapping/>
+  </p:clrMapOvr>
+</p:sld>
+</file>
+
+<file path=ppt/slides/slide23.xml><?xml version="1.0" encoding="utf-8"?>
+<p:sld xmlns:a="http://schemas.openxmlformats.org/drawingml/2006/main" xmlns:r="http://schemas.openxmlformats.org/officeDocument/2006/relationships" xmlns:p="http://schemas.openxmlformats.org/presentationml/2006/main">
+  <p:cSld>
+    <p:spTree>
+      <p:nvGrpSpPr>
+        <p:cNvPr id="1" name=""/>
+        <p:cNvGrpSpPr/>
+        <p:nvPr/>
+      </p:nvGrpSpPr>
+      <p:grpSpPr>
+        <a:xfrm>
+          <a:off x="0" y="0"/>
+          <a:ext cx="0" cy="0"/>
+          <a:chOff x="0" y="0"/>
+          <a:chExt cx="0" cy="0"/>
+        </a:xfrm>
+      </p:grpSpPr>
+      <p:sp>
+        <p:nvSpPr>
+          <p:cNvPr id="2" name="Title 1">
+            <a:extLst>
+              <a:ext uri="{FF2B5EF4-FFF2-40B4-BE49-F238E27FC236}">
+                <a16:creationId xmlns:a16="http://schemas.microsoft.com/office/drawing/2014/main" id="{FA0F677B-A874-0C8D-5E90-31795C7D4579}"/>
+              </a:ext>
+            </a:extLst>
+          </p:cNvPr>
+          <p:cNvSpPr>
+            <a:spLocks noGrp="1"/>
+          </p:cNvSpPr>
+          <p:nvPr>
+            <p:ph type="title"/>
+          </p:nvPr>
+        </p:nvSpPr>
+        <p:spPr/>
+        <p:txBody>
+          <a:bodyPr>
+            <a:normAutofit/>
+          </a:bodyPr>
+          <a:lstStyle/>
+          <a:p>
+            <a:r>
+              <a:rPr lang="en-US" b="0" i="0" dirty="0">
+                <a:solidFill>
+                  <a:srgbClr val="374151"/>
+                </a:solidFill>
+                <a:effectLst/>
+                <a:latin typeface="Söhne"/>
+              </a:rPr>
+              <a:t>VI. Conclusion A. Recap of key takeaways</a:t>
+            </a:r>
+            <a:br>
+              <a:rPr lang="en-US" b="0" i="0" dirty="0">
+                <a:solidFill>
+                  <a:srgbClr val="374151"/>
+                </a:solidFill>
+                <a:effectLst/>
+                <a:latin typeface="Söhne"/>
+              </a:rPr>
+            </a:br>
+            <a:endParaRPr lang="en-US" dirty="0"/>
+          </a:p>
+        </p:txBody>
+      </p:sp>
+      <p:sp>
+        <p:nvSpPr>
+          <p:cNvPr id="3" name="Content Placeholder 2">
+            <a:extLst>
+              <a:ext uri="{FF2B5EF4-FFF2-40B4-BE49-F238E27FC236}">
+                <a16:creationId xmlns:a16="http://schemas.microsoft.com/office/drawing/2014/main" id="{1E5BE794-45D7-6D92-3888-2904A7A86220}"/>
+              </a:ext>
+            </a:extLst>
+          </p:cNvPr>
+          <p:cNvSpPr>
+            <a:spLocks noGrp="1"/>
+          </p:cNvSpPr>
+          <p:nvPr>
+            <p:ph idx="1"/>
+          </p:nvPr>
+        </p:nvSpPr>
+        <p:spPr/>
+        <p:txBody>
+          <a:bodyPr/>
+          <a:lstStyle/>
+          <a:p>
+            <a:endParaRPr lang="en-US"/>
+          </a:p>
+        </p:txBody>
+      </p:sp>
+      <p:sp>
+        <p:nvSpPr>
+          <p:cNvPr id="5" name="TextBox 4">
+            <a:extLst>
+              <a:ext uri="{FF2B5EF4-FFF2-40B4-BE49-F238E27FC236}">
+                <a16:creationId xmlns:a16="http://schemas.microsoft.com/office/drawing/2014/main" id="{26274D53-1A07-67A9-24EA-A3C2CC361275}"/>
+              </a:ext>
+            </a:extLst>
+          </p:cNvPr>
+          <p:cNvSpPr txBox="1"/>
+          <p:nvPr/>
+        </p:nvSpPr>
+        <p:spPr>
+          <a:xfrm>
+            <a:off x="3048856" y="3108403"/>
+            <a:ext cx="6097712" cy="646331"/>
+          </a:xfrm>
+          <a:prstGeom prst="rect">
+            <a:avLst/>
+          </a:prstGeom>
+          <a:noFill/>
+        </p:spPr>
+        <p:txBody>
+          <a:bodyPr wrap="square">
+            <a:spAutoFit/>
+          </a:bodyPr>
+          <a:lstStyle/>
+          <a:p>
+            <a:r>
+              <a:rPr lang="en-US" b="0" i="0" dirty="0">
+                <a:solidFill>
+                  <a:srgbClr val="374151"/>
+                </a:solidFill>
+                <a:effectLst/>
+                <a:latin typeface="Söhne"/>
+              </a:rPr>
+              <a:t>B. Future improvements to GitHub Actions C. Additional resources and references</a:t>
+            </a:r>
+            <a:endParaRPr lang="en-US" dirty="0"/>
+          </a:p>
+        </p:txBody>
+      </p:sp>
+    </p:spTree>
+    <p:extLst>
+      <p:ext uri="{BB962C8B-B14F-4D97-AF65-F5344CB8AC3E}">
+        <p14:creationId xmlns:p14="http://schemas.microsoft.com/office/powerpoint/2010/main" val="2024606021"/>
+      </p:ext>
+    </p:extLst>
+  </p:cSld>
+  <p:clrMapOvr>
+    <a:masterClrMapping/>
+  </p:clrMapOvr>
+</p:sld>
+</file>
+
+<file path=ppt/slides/slide24.xml><?xml version="1.0" encoding="utf-8"?>
+<p:sld xmlns:a="http://schemas.openxmlformats.org/drawingml/2006/main" xmlns:r="http://schemas.openxmlformats.org/officeDocument/2006/relationships" xmlns:p="http://schemas.openxmlformats.org/presentationml/2006/main">
+  <p:cSld>
+    <p:spTree>
+      <p:nvGrpSpPr>
+        <p:cNvPr id="1" name=""/>
+        <p:cNvGrpSpPr/>
+        <p:nvPr/>
+      </p:nvGrpSpPr>
+      <p:grpSpPr>
+        <a:xfrm>
+          <a:off x="0" y="0"/>
+          <a:ext cx="0" cy="0"/>
+          <a:chOff x="0" y="0"/>
+          <a:chExt cx="0" cy="0"/>
+        </a:xfrm>
+      </p:grpSpPr>
+      <p:sp>
+        <p:nvSpPr>
+          <p:cNvPr id="2" name="Title 1">
+            <a:extLst>
+              <a:ext uri="{FF2B5EF4-FFF2-40B4-BE49-F238E27FC236}">
+                <a16:creationId xmlns:a16="http://schemas.microsoft.com/office/drawing/2014/main" id="{9B67E82B-4090-096A-B90C-69EE98146A07}"/>
+              </a:ext>
+            </a:extLst>
+          </p:cNvPr>
+          <p:cNvSpPr>
+            <a:spLocks noGrp="1"/>
+          </p:cNvSpPr>
+          <p:nvPr>
+            <p:ph type="title"/>
+          </p:nvPr>
+        </p:nvSpPr>
+        <p:spPr/>
+        <p:txBody>
+          <a:bodyPr/>
+          <a:lstStyle/>
+          <a:p>
+            <a:r>
+              <a:rPr lang="en-US" b="0" i="0" dirty="0">
+                <a:solidFill>
+                  <a:srgbClr val="374151"/>
+                </a:solidFill>
+                <a:effectLst/>
+                <a:latin typeface="Söhne"/>
+              </a:rPr>
+              <a:t>B. Future improvements to GitHub Actions</a:t>
+            </a:r>
+            <a:endParaRPr lang="en-US" dirty="0"/>
+          </a:p>
+        </p:txBody>
+      </p:sp>
+      <p:sp>
+        <p:nvSpPr>
+          <p:cNvPr id="3" name="Content Placeholder 2">
+            <a:extLst>
+              <a:ext uri="{FF2B5EF4-FFF2-40B4-BE49-F238E27FC236}">
+                <a16:creationId xmlns:a16="http://schemas.microsoft.com/office/drawing/2014/main" id="{8BB6B1F0-F837-214F-44CE-2839D4384B85}"/>
+              </a:ext>
+            </a:extLst>
+          </p:cNvPr>
+          <p:cNvSpPr>
+            <a:spLocks noGrp="1"/>
+          </p:cNvSpPr>
+          <p:nvPr>
+            <p:ph idx="1"/>
+          </p:nvPr>
+        </p:nvSpPr>
+        <p:spPr/>
+        <p:txBody>
+          <a:bodyPr/>
+          <a:lstStyle/>
+          <a:p>
+            <a:endParaRPr lang="en-US"/>
+          </a:p>
+        </p:txBody>
+      </p:sp>
+    </p:spTree>
+    <p:extLst>
+      <p:ext uri="{BB962C8B-B14F-4D97-AF65-F5344CB8AC3E}">
+        <p14:creationId xmlns:p14="http://schemas.microsoft.com/office/powerpoint/2010/main" val="1243268020"/>
+      </p:ext>
+    </p:extLst>
+  </p:cSld>
+  <p:clrMapOvr>
+    <a:masterClrMapping/>
+  </p:clrMapOvr>
+</p:sld>
+</file>
+
+<file path=ppt/slides/slide25.xml><?xml version="1.0" encoding="utf-8"?>
+<p:sld xmlns:a="http://schemas.openxmlformats.org/drawingml/2006/main" xmlns:r="http://schemas.openxmlformats.org/officeDocument/2006/relationships" xmlns:p="http://schemas.openxmlformats.org/presentationml/2006/main">
+  <p:cSld>
+    <p:spTree>
+      <p:nvGrpSpPr>
+        <p:cNvPr id="1" name=""/>
+        <p:cNvGrpSpPr/>
+        <p:nvPr/>
+      </p:nvGrpSpPr>
+      <p:grpSpPr>
+        <a:xfrm>
+          <a:off x="0" y="0"/>
+          <a:ext cx="0" cy="0"/>
+          <a:chOff x="0" y="0"/>
+          <a:chExt cx="0" cy="0"/>
+        </a:xfrm>
+      </p:grpSpPr>
+      <p:sp>
+        <p:nvSpPr>
+          <p:cNvPr id="2" name="Title 1">
+            <a:extLst>
+              <a:ext uri="{FF2B5EF4-FFF2-40B4-BE49-F238E27FC236}">
+                <a16:creationId xmlns:a16="http://schemas.microsoft.com/office/drawing/2014/main" id="{7EDA817F-EE0E-6D37-BB43-37F415C8C170}"/>
+              </a:ext>
+            </a:extLst>
+          </p:cNvPr>
+          <p:cNvSpPr>
+            <a:spLocks noGrp="1"/>
+          </p:cNvSpPr>
+          <p:nvPr>
+            <p:ph type="title"/>
+          </p:nvPr>
+        </p:nvSpPr>
+        <p:spPr/>
+        <p:txBody>
+          <a:bodyPr/>
+          <a:lstStyle/>
+          <a:p>
+            <a:r>
+              <a:rPr lang="en-US" b="0" i="0" dirty="0">
+                <a:solidFill>
+                  <a:srgbClr val="374151"/>
+                </a:solidFill>
+                <a:effectLst/>
+                <a:latin typeface="Söhne"/>
+              </a:rPr>
+              <a:t>C. Additional resources and references</a:t>
+            </a:r>
+            <a:endParaRPr lang="en-US" dirty="0"/>
+          </a:p>
+        </p:txBody>
+      </p:sp>
+      <p:sp>
+        <p:nvSpPr>
+          <p:cNvPr id="3" name="Content Placeholder 2">
+            <a:extLst>
+              <a:ext uri="{FF2B5EF4-FFF2-40B4-BE49-F238E27FC236}">
+                <a16:creationId xmlns:a16="http://schemas.microsoft.com/office/drawing/2014/main" id="{126C2C7C-56DA-3D11-1F21-4980036DA941}"/>
+              </a:ext>
+            </a:extLst>
+          </p:cNvPr>
+          <p:cNvSpPr>
+            <a:spLocks noGrp="1"/>
+          </p:cNvSpPr>
+          <p:nvPr>
+            <p:ph idx="1"/>
+          </p:nvPr>
+        </p:nvSpPr>
+        <p:spPr/>
+        <p:txBody>
+          <a:bodyPr/>
+          <a:lstStyle/>
+          <a:p>
+            <a:endParaRPr lang="en-US" dirty="0"/>
+          </a:p>
+        </p:txBody>
+      </p:sp>
+    </p:spTree>
+    <p:extLst>
+      <p:ext uri="{BB962C8B-B14F-4D97-AF65-F5344CB8AC3E}">
+        <p14:creationId xmlns:p14="http://schemas.microsoft.com/office/powerpoint/2010/main" val="1974983092"/>
+      </p:ext>
+    </p:extLst>
+  </p:cSld>
+  <p:clrMapOvr>
+    <a:masterClrMapping/>
+  </p:clrMapOvr>
+</p:sld>
+</file>
+
+<file path=ppt/slides/slide3.xml><?xml version="1.0" encoding="utf-8"?>
+<p:sld xmlns:a="http://schemas.openxmlformats.org/drawingml/2006/main" xmlns:r="http://schemas.openxmlformats.org/officeDocument/2006/relationships" xmlns:p="http://schemas.openxmlformats.org/presentationml/2006/main">
+  <p:cSld>
+    <p:spTree>
+      <p:nvGrpSpPr>
+        <p:cNvPr id="1" name=""/>
+        <p:cNvGrpSpPr/>
+        <p:nvPr/>
+      </p:nvGrpSpPr>
+      <p:grpSpPr>
+        <a:xfrm>
+          <a:off x="0" y="0"/>
+          <a:ext cx="0" cy="0"/>
+          <a:chOff x="0" y="0"/>
+          <a:chExt cx="0" cy="0"/>
+        </a:xfrm>
+      </p:grpSpPr>
+      <p:sp>
+        <p:nvSpPr>
+          <p:cNvPr id="2" name="Title 1">
+            <a:extLst>
+              <a:ext uri="{FF2B5EF4-FFF2-40B4-BE49-F238E27FC236}">
+                <a16:creationId xmlns:a16="http://schemas.microsoft.com/office/drawing/2014/main" id="{31A8945E-D433-2726-0149-4802FF786025}"/>
+              </a:ext>
+            </a:extLst>
+          </p:cNvPr>
+          <p:cNvSpPr>
+            <a:spLocks noGrp="1"/>
+          </p:cNvSpPr>
+          <p:nvPr>
+            <p:ph type="title"/>
+          </p:nvPr>
+        </p:nvSpPr>
+        <p:spPr/>
+        <p:txBody>
+          <a:bodyPr/>
+          <a:lstStyle/>
+          <a:p>
+            <a:r>
+              <a:rPr lang="en-US" b="0" i="0" dirty="0">
+                <a:solidFill>
+                  <a:srgbClr val="374151"/>
+                </a:solidFill>
+                <a:effectLst/>
+                <a:latin typeface="Söhne"/>
+              </a:rPr>
+              <a:t>B. Advantages of using GitHub Actions</a:t>
+            </a:r>
+            <a:endParaRPr lang="en-US" dirty="0"/>
+          </a:p>
+        </p:txBody>
+      </p:sp>
+      <p:sp>
+        <p:nvSpPr>
+          <p:cNvPr id="3" name="Content Placeholder 2">
+            <a:extLst>
+              <a:ext uri="{FF2B5EF4-FFF2-40B4-BE49-F238E27FC236}">
+                <a16:creationId xmlns:a16="http://schemas.microsoft.com/office/drawing/2014/main" id="{BCF72ACC-47FA-1B0A-0F89-8EE8BE4D4172}"/>
+              </a:ext>
+            </a:extLst>
+          </p:cNvPr>
+          <p:cNvSpPr>
+            <a:spLocks noGrp="1"/>
+          </p:cNvSpPr>
+          <p:nvPr>
+            <p:ph idx="1"/>
+          </p:nvPr>
+        </p:nvSpPr>
+        <p:spPr/>
+        <p:txBody>
+          <a:bodyPr/>
+          <a:lstStyle/>
+          <a:p>
+            <a:endParaRPr lang="en-US"/>
+          </a:p>
+        </p:txBody>
+      </p:sp>
+    </p:spTree>
+    <p:extLst>
+      <p:ext uri="{BB962C8B-B14F-4D97-AF65-F5344CB8AC3E}">
+        <p14:creationId xmlns:p14="http://schemas.microsoft.com/office/powerpoint/2010/main" val="2397704679"/>
+      </p:ext>
+    </p:extLst>
+  </p:cSld>
+  <p:clrMapOvr>
+    <a:masterClrMapping/>
+  </p:clrMapOvr>
+</p:sld>
+</file>
+
+<file path=ppt/slides/slide4.xml><?xml version="1.0" encoding="utf-8"?>
+<p:sld xmlns:a="http://schemas.openxmlformats.org/drawingml/2006/main" xmlns:r="http://schemas.openxmlformats.org/officeDocument/2006/relationships" xmlns:p="http://schemas.openxmlformats.org/presentationml/2006/main">
+  <p:cSld>
+    <p:spTree>
+      <p:nvGrpSpPr>
+        <p:cNvPr id="1" name=""/>
+        <p:cNvGrpSpPr/>
+        <p:nvPr/>
+      </p:nvGrpSpPr>
+      <p:grpSpPr>
+        <a:xfrm>
+          <a:off x="0" y="0"/>
+          <a:ext cx="0" cy="0"/>
+          <a:chOff x="0" y="0"/>
+          <a:chExt cx="0" cy="0"/>
+        </a:xfrm>
+      </p:grpSpPr>
+      <p:sp>
+        <p:nvSpPr>
+          <p:cNvPr id="2" name="Title 1">
+            <a:extLst>
+              <a:ext uri="{FF2B5EF4-FFF2-40B4-BE49-F238E27FC236}">
+                <a16:creationId xmlns:a16="http://schemas.microsoft.com/office/drawing/2014/main" id="{EAED473A-E8F1-2259-6C60-4F6F0F72C630}"/>
+              </a:ext>
+            </a:extLst>
+          </p:cNvPr>
+          <p:cNvSpPr>
+            <a:spLocks noGrp="1"/>
+          </p:cNvSpPr>
+          <p:nvPr>
+            <p:ph type="title"/>
+          </p:nvPr>
+        </p:nvSpPr>
+        <p:spPr/>
+        <p:txBody>
+          <a:bodyPr/>
+          <a:lstStyle/>
+          <a:p>
+            <a:r>
+              <a:rPr lang="en-US" b="0" i="0" dirty="0">
+                <a:solidFill>
+                  <a:srgbClr val="374151"/>
+                </a:solidFill>
+                <a:effectLst/>
+                <a:latin typeface="Söhne"/>
+              </a:rPr>
+              <a:t>C. Purpose of the presentation</a:t>
+            </a:r>
+            <a:endParaRPr lang="en-US" dirty="0"/>
+          </a:p>
+        </p:txBody>
+      </p:sp>
+      <p:sp>
+        <p:nvSpPr>
+          <p:cNvPr id="3" name="Content Placeholder 2">
+            <a:extLst>
+              <a:ext uri="{FF2B5EF4-FFF2-40B4-BE49-F238E27FC236}">
+                <a16:creationId xmlns:a16="http://schemas.microsoft.com/office/drawing/2014/main" id="{44DF6968-90D6-3D64-09C2-A782EFE754B9}"/>
+              </a:ext>
+            </a:extLst>
+          </p:cNvPr>
+          <p:cNvSpPr>
+            <a:spLocks noGrp="1"/>
+          </p:cNvSpPr>
+          <p:nvPr>
+            <p:ph idx="1"/>
+          </p:nvPr>
+        </p:nvSpPr>
+        <p:spPr/>
+        <p:txBody>
+          <a:bodyPr/>
+          <a:lstStyle/>
+          <a:p>
+            <a:endParaRPr lang="en-US" dirty="0"/>
+          </a:p>
+        </p:txBody>
+      </p:sp>
+    </p:spTree>
+    <p:extLst>
+      <p:ext uri="{BB962C8B-B14F-4D97-AF65-F5344CB8AC3E}">
+        <p14:creationId xmlns:p14="http://schemas.microsoft.com/office/powerpoint/2010/main" val="1289422698"/>
+      </p:ext>
+    </p:extLst>
+  </p:cSld>
+  <p:clrMapOvr>
+    <a:masterClrMapping/>
+  </p:clrMapOvr>
+</p:sld>
+</file>
+
+<file path=ppt/slides/slide5.xml><?xml version="1.0" encoding="utf-8"?>
+<p:sld xmlns:a="http://schemas.openxmlformats.org/drawingml/2006/main" xmlns:r="http://schemas.openxmlformats.org/officeDocument/2006/relationships" xmlns:p="http://schemas.openxmlformats.org/presentationml/2006/main">
+  <p:cSld>
+    <p:spTree>
+      <p:nvGrpSpPr>
+        <p:cNvPr id="1" name=""/>
+        <p:cNvGrpSpPr/>
+        <p:nvPr/>
+      </p:nvGrpSpPr>
+      <p:grpSpPr>
+        <a:xfrm>
+          <a:off x="0" y="0"/>
+          <a:ext cx="0" cy="0"/>
+          <a:chOff x="0" y="0"/>
+          <a:chExt cx="0" cy="0"/>
+        </a:xfrm>
+      </p:grpSpPr>
+      <p:sp>
+        <p:nvSpPr>
+          <p:cNvPr id="2" name="Title 1">
+            <a:extLst>
+              <a:ext uri="{FF2B5EF4-FFF2-40B4-BE49-F238E27FC236}">
+                <a16:creationId xmlns:a16="http://schemas.microsoft.com/office/drawing/2014/main" id="{43F198E8-F711-CF3D-0D42-F11D76B7D880}"/>
+              </a:ext>
+            </a:extLst>
+          </p:cNvPr>
+          <p:cNvSpPr>
+            <a:spLocks noGrp="1"/>
+          </p:cNvSpPr>
+          <p:nvPr>
+            <p:ph type="title"/>
+          </p:nvPr>
+        </p:nvSpPr>
+        <p:spPr/>
+        <p:txBody>
+          <a:bodyPr>
+            <a:normAutofit/>
+          </a:bodyPr>
+          <a:lstStyle/>
+          <a:p>
+            <a:r>
+              <a:rPr lang="en-US" b="0" i="0" dirty="0">
+                <a:solidFill>
+                  <a:srgbClr val="374151"/>
+                </a:solidFill>
+                <a:effectLst/>
+                <a:latin typeface="Söhne"/>
+              </a:rPr>
+              <a:t>II. Setting up a GitHub Actions workflow A. Creating a repository</a:t>
+            </a:r>
+            <a:endParaRPr lang="en-US" dirty="0"/>
+          </a:p>
+        </p:txBody>
+      </p:sp>
+      <p:sp>
+        <p:nvSpPr>
+          <p:cNvPr id="3" name="Content Placeholder 2">
+            <a:extLst>
+              <a:ext uri="{FF2B5EF4-FFF2-40B4-BE49-F238E27FC236}">
+                <a16:creationId xmlns:a16="http://schemas.microsoft.com/office/drawing/2014/main" id="{D97B1D3E-0716-A4C0-88C1-07116090979A}"/>
+              </a:ext>
+            </a:extLst>
+          </p:cNvPr>
+          <p:cNvSpPr>
+            <a:spLocks noGrp="1"/>
+          </p:cNvSpPr>
+          <p:nvPr>
+            <p:ph idx="1"/>
+          </p:nvPr>
+        </p:nvSpPr>
+        <p:spPr/>
+        <p:txBody>
+          <a:bodyPr/>
+          <a:lstStyle/>
+          <a:p>
+            <a:endParaRPr lang="en-US"/>
+          </a:p>
+        </p:txBody>
+      </p:sp>
+    </p:spTree>
+    <p:extLst>
+      <p:ext uri="{BB962C8B-B14F-4D97-AF65-F5344CB8AC3E}">
+        <p14:creationId xmlns:p14="http://schemas.microsoft.com/office/powerpoint/2010/main" val="3355493529"/>
+      </p:ext>
+    </p:extLst>
+  </p:cSld>
+  <p:clrMapOvr>
+    <a:masterClrMapping/>
+  </p:clrMapOvr>
+</p:sld>
+</file>
+
+<file path=ppt/slides/slide6.xml><?xml version="1.0" encoding="utf-8"?>
+<p:sld xmlns:a="http://schemas.openxmlformats.org/drawingml/2006/main" xmlns:r="http://schemas.openxmlformats.org/officeDocument/2006/relationships" xmlns:p="http://schemas.openxmlformats.org/presentationml/2006/main">
+  <p:cSld>
+    <p:spTree>
+      <p:nvGrpSpPr>
+        <p:cNvPr id="1" name=""/>
+        <p:cNvGrpSpPr/>
+        <p:nvPr/>
+      </p:nvGrpSpPr>
+      <p:grpSpPr>
+        <a:xfrm>
+          <a:off x="0" y="0"/>
+          <a:ext cx="0" cy="0"/>
+          <a:chOff x="0" y="0"/>
+          <a:chExt cx="0" cy="0"/>
+        </a:xfrm>
+      </p:grpSpPr>
+      <p:sp>
+        <p:nvSpPr>
+          <p:cNvPr id="2" name="Title 1">
+            <a:extLst>
+              <a:ext uri="{FF2B5EF4-FFF2-40B4-BE49-F238E27FC236}">
+                <a16:creationId xmlns:a16="http://schemas.microsoft.com/office/drawing/2014/main" id="{B183B803-3256-5674-C51A-090B1BD817F9}"/>
+              </a:ext>
+            </a:extLst>
+          </p:cNvPr>
+          <p:cNvSpPr>
+            <a:spLocks noGrp="1"/>
+          </p:cNvSpPr>
+          <p:nvPr>
+            <p:ph type="title"/>
+          </p:nvPr>
+        </p:nvSpPr>
+        <p:spPr/>
+        <p:txBody>
+          <a:bodyPr>
+            <a:normAutofit/>
+          </a:bodyPr>
+          <a:lstStyle/>
+          <a:p>
+            <a:r>
+              <a:rPr lang="en-US" b="0" i="0" dirty="0">
+                <a:solidFill>
+                  <a:srgbClr val="374151"/>
+                </a:solidFill>
+                <a:effectLst/>
+                <a:latin typeface="Söhne"/>
+              </a:rPr>
+              <a:t>B. Enabling Actions</a:t>
+            </a:r>
+            <a:endParaRPr lang="en-US" dirty="0"/>
+          </a:p>
+        </p:txBody>
+      </p:sp>
+      <p:sp>
+        <p:nvSpPr>
+          <p:cNvPr id="3" name="Content Placeholder 2">
+            <a:extLst>
+              <a:ext uri="{FF2B5EF4-FFF2-40B4-BE49-F238E27FC236}">
+                <a16:creationId xmlns:a16="http://schemas.microsoft.com/office/drawing/2014/main" id="{5A9844C7-3731-FF21-44EB-0D632E5DD5A7}"/>
+              </a:ext>
+            </a:extLst>
+          </p:cNvPr>
+          <p:cNvSpPr>
+            <a:spLocks noGrp="1"/>
+          </p:cNvSpPr>
+          <p:nvPr>
+            <p:ph idx="1"/>
+          </p:nvPr>
+        </p:nvSpPr>
+        <p:spPr/>
+        <p:txBody>
+          <a:bodyPr/>
+          <a:lstStyle/>
+          <a:p>
+            <a:endParaRPr lang="en-US"/>
+          </a:p>
+        </p:txBody>
+      </p:sp>
+    </p:spTree>
+    <p:extLst>
+      <p:ext uri="{BB962C8B-B14F-4D97-AF65-F5344CB8AC3E}">
+        <p14:creationId xmlns:p14="http://schemas.microsoft.com/office/powerpoint/2010/main" val="1155617248"/>
+      </p:ext>
+    </p:extLst>
+  </p:cSld>
+  <p:clrMapOvr>
+    <a:masterClrMapping/>
+  </p:clrMapOvr>
+</p:sld>
+</file>
+
+<file path=ppt/slides/slide7.xml><?xml version="1.0" encoding="utf-8"?>
+<p:sld xmlns:a="http://schemas.openxmlformats.org/drawingml/2006/main" xmlns:r="http://schemas.openxmlformats.org/officeDocument/2006/relationships" xmlns:p="http://schemas.openxmlformats.org/presentationml/2006/main">
+  <p:cSld>
+    <p:spTree>
+      <p:nvGrpSpPr>
+        <p:cNvPr id="1" name=""/>
+        <p:cNvGrpSpPr/>
+        <p:nvPr/>
+      </p:nvGrpSpPr>
+      <p:grpSpPr>
+        <a:xfrm>
+          <a:off x="0" y="0"/>
+          <a:ext cx="0" cy="0"/>
+          <a:chOff x="0" y="0"/>
+          <a:chExt cx="0" cy="0"/>
+        </a:xfrm>
+      </p:grpSpPr>
+      <p:sp>
+        <p:nvSpPr>
+          <p:cNvPr id="2" name="Title 1">
+            <a:extLst>
+              <a:ext uri="{FF2B5EF4-FFF2-40B4-BE49-F238E27FC236}">
+                <a16:creationId xmlns:a16="http://schemas.microsoft.com/office/drawing/2014/main" id="{F1536FB9-5338-0C35-9A45-4FF7717FCD7A}"/>
+              </a:ext>
+            </a:extLst>
+          </p:cNvPr>
+          <p:cNvSpPr>
+            <a:spLocks noGrp="1"/>
+          </p:cNvSpPr>
+          <p:nvPr>
+            <p:ph type="title"/>
+          </p:nvPr>
+        </p:nvSpPr>
+        <p:spPr/>
+        <p:txBody>
+          <a:bodyPr>
+            <a:normAutofit/>
+          </a:bodyPr>
+          <a:lstStyle/>
+          <a:p>
+            <a:r>
+              <a:rPr lang="en-US" b="0" i="0" dirty="0">
+                <a:solidFill>
+                  <a:srgbClr val="374151"/>
+                </a:solidFill>
+                <a:effectLst/>
+                <a:latin typeface="Söhne"/>
+              </a:rPr>
+              <a:t>C. Creating a new workflow file</a:t>
+            </a:r>
+            <a:endParaRPr lang="en-US" dirty="0"/>
+          </a:p>
+        </p:txBody>
+      </p:sp>
+      <p:sp>
+        <p:nvSpPr>
+          <p:cNvPr id="3" name="Content Placeholder 2">
+            <a:extLst>
+              <a:ext uri="{FF2B5EF4-FFF2-40B4-BE49-F238E27FC236}">
+                <a16:creationId xmlns:a16="http://schemas.microsoft.com/office/drawing/2014/main" id="{EE331773-DA89-6E8C-8130-B9C9A7BFE1CD}"/>
+              </a:ext>
+            </a:extLst>
+          </p:cNvPr>
+          <p:cNvSpPr>
+            <a:spLocks noGrp="1"/>
+          </p:cNvSpPr>
+          <p:nvPr>
+            <p:ph idx="1"/>
+          </p:nvPr>
+        </p:nvSpPr>
+        <p:spPr/>
+        <p:txBody>
+          <a:bodyPr/>
+          <a:lstStyle/>
+          <a:p>
+            <a:endParaRPr lang="en-US"/>
+          </a:p>
+        </p:txBody>
+      </p:sp>
+    </p:spTree>
+    <p:extLst>
+      <p:ext uri="{BB962C8B-B14F-4D97-AF65-F5344CB8AC3E}">
+        <p14:creationId xmlns:p14="http://schemas.microsoft.com/office/powerpoint/2010/main" val="3910798870"/>
+      </p:ext>
+    </p:extLst>
+  </p:cSld>
+  <p:clrMapOvr>
+    <a:masterClrMapping/>
+  </p:clrMapOvr>
+</p:sld>
+</file>
+
+<file path=ppt/slides/slide8.xml><?xml version="1.0" encoding="utf-8"?>
+<p:sld xmlns:a="http://schemas.openxmlformats.org/drawingml/2006/main" xmlns:r="http://schemas.openxmlformats.org/officeDocument/2006/relationships" xmlns:p="http://schemas.openxmlformats.org/presentationml/2006/main">
+  <p:cSld>
+    <p:spTree>
+      <p:nvGrpSpPr>
+        <p:cNvPr id="1" name=""/>
+        <p:cNvGrpSpPr/>
+        <p:nvPr/>
+      </p:nvGrpSpPr>
+      <p:grpSpPr>
+        <a:xfrm>
+          <a:off x="0" y="0"/>
+          <a:ext cx="0" cy="0"/>
+          <a:chOff x="0" y="0"/>
+          <a:chExt cx="0" cy="0"/>
+        </a:xfrm>
+      </p:grpSpPr>
+      <p:sp>
+        <p:nvSpPr>
+          <p:cNvPr id="2" name="Title 1">
+            <a:extLst>
+              <a:ext uri="{FF2B5EF4-FFF2-40B4-BE49-F238E27FC236}">
+                <a16:creationId xmlns:a16="http://schemas.microsoft.com/office/drawing/2014/main" id="{C94FC33C-9A2A-DAA5-DC31-029FA4FCF83E}"/>
+              </a:ext>
+            </a:extLst>
+          </p:cNvPr>
+          <p:cNvSpPr>
+            <a:spLocks noGrp="1"/>
+          </p:cNvSpPr>
+          <p:nvPr>
+            <p:ph type="title"/>
+          </p:nvPr>
+        </p:nvSpPr>
+        <p:spPr/>
+        <p:txBody>
+          <a:bodyPr>
+            <a:normAutofit/>
+          </a:bodyPr>
+          <a:lstStyle/>
+          <a:p>
+            <a:r>
+              <a:rPr lang="en-US" b="0" i="0" dirty="0">
+                <a:solidFill>
+                  <a:srgbClr val="374151"/>
+                </a:solidFill>
+                <a:effectLst/>
+                <a:latin typeface="Söhne"/>
+              </a:rPr>
+              <a:t>D. Adding workflow events</a:t>
+            </a:r>
+            <a:br>
+              <a:rPr lang="en-US" b="0" i="0" dirty="0">
+                <a:solidFill>
+                  <a:srgbClr val="374151"/>
+                </a:solidFill>
+                <a:effectLst/>
+                <a:latin typeface="Söhne"/>
+              </a:rPr>
+            </a:br>
+            <a:endParaRPr lang="en-US" dirty="0"/>
+          </a:p>
+        </p:txBody>
+      </p:sp>
+      <p:sp>
+        <p:nvSpPr>
+          <p:cNvPr id="3" name="Content Placeholder 2">
+            <a:extLst>
+              <a:ext uri="{FF2B5EF4-FFF2-40B4-BE49-F238E27FC236}">
+                <a16:creationId xmlns:a16="http://schemas.microsoft.com/office/drawing/2014/main" id="{ADD5DC12-DC2C-D76A-55F7-8B144974624D}"/>
+              </a:ext>
+            </a:extLst>
+          </p:cNvPr>
+          <p:cNvSpPr>
+            <a:spLocks noGrp="1"/>
+          </p:cNvSpPr>
+          <p:nvPr>
+            <p:ph idx="1"/>
+          </p:nvPr>
+        </p:nvSpPr>
+        <p:spPr/>
+        <p:txBody>
+          <a:bodyPr/>
+          <a:lstStyle/>
+          <a:p>
+            <a:endParaRPr lang="en-US"/>
+          </a:p>
+        </p:txBody>
+      </p:sp>
+    </p:spTree>
+    <p:extLst>
+      <p:ext uri="{BB962C8B-B14F-4D97-AF65-F5344CB8AC3E}">
+        <p14:creationId xmlns:p14="http://schemas.microsoft.com/office/powerpoint/2010/main" val="1602303146"/>
+      </p:ext>
+    </p:extLst>
+  </p:cSld>
+  <p:clrMapOvr>
+    <a:masterClrMapping/>
+  </p:clrMapOvr>
+</p:sld>
+</file>
+
+<file path=ppt/slides/slide9.xml><?xml version="1.0" encoding="utf-8"?>
+<p:sld xmlns:a="http://schemas.openxmlformats.org/drawingml/2006/main" xmlns:r="http://schemas.openxmlformats.org/officeDocument/2006/relationships" xmlns:p="http://schemas.openxmlformats.org/presentationml/2006/main">
+  <p:cSld>
+    <p:spTree>
+      <p:nvGrpSpPr>
+        <p:cNvPr id="1" name=""/>
+        <p:cNvGrpSpPr/>
+        <p:nvPr/>
+      </p:nvGrpSpPr>
+      <p:grpSpPr>
+        <a:xfrm>
+          <a:off x="0" y="0"/>
+          <a:ext cx="0" cy="0"/>
+          <a:chOff x="0" y="0"/>
+          <a:chExt cx="0" cy="0"/>
+        </a:xfrm>
+      </p:grpSpPr>
+      <p:sp>
+        <p:nvSpPr>
+          <p:cNvPr id="2" name="Title 1">
+            <a:extLst>
+              <a:ext uri="{FF2B5EF4-FFF2-40B4-BE49-F238E27FC236}">
+                <a16:creationId xmlns:a16="http://schemas.microsoft.com/office/drawing/2014/main" id="{4221A4BA-EFBA-542A-413E-CAB2781259FE}"/>
+              </a:ext>
+            </a:extLst>
+          </p:cNvPr>
+          <p:cNvSpPr>
+            <a:spLocks noGrp="1"/>
+          </p:cNvSpPr>
+          <p:nvPr>
+            <p:ph type="title"/>
+          </p:nvPr>
+        </p:nvSpPr>
+        <p:spPr/>
+        <p:txBody>
+          <a:bodyPr/>
+          <a:lstStyle/>
+          <a:p>
+            <a:r>
+              <a:rPr lang="en-US" b="0" i="0" dirty="0">
+                <a:solidFill>
+                  <a:srgbClr val="374151"/>
+                </a:solidFill>
+                <a:effectLst/>
+                <a:latin typeface="Söhne"/>
+              </a:rPr>
+              <a:t>E. Adding workflow jobs</a:t>
+            </a:r>
+            <a:endParaRPr lang="en-US" dirty="0"/>
+          </a:p>
+        </p:txBody>
+      </p:sp>
+      <p:sp>
+        <p:nvSpPr>
+          <p:cNvPr id="3" name="Content Placeholder 2">
+            <a:extLst>
+              <a:ext uri="{FF2B5EF4-FFF2-40B4-BE49-F238E27FC236}">
+                <a16:creationId xmlns:a16="http://schemas.microsoft.com/office/drawing/2014/main" id="{8AD68730-40BE-BB6E-F662-353325191254}"/>
+              </a:ext>
+            </a:extLst>
+          </p:cNvPr>
+          <p:cNvSpPr>
+            <a:spLocks noGrp="1"/>
+          </p:cNvSpPr>
+          <p:nvPr>
+            <p:ph idx="1"/>
+          </p:nvPr>
+        </p:nvSpPr>
+        <p:spPr/>
+        <p:txBody>
+          <a:bodyPr/>
+          <a:lstStyle/>
+          <a:p>
+            <a:endParaRPr lang="en-US"/>
+          </a:p>
+        </p:txBody>
+      </p:sp>
+    </p:spTree>
+    <p:extLst>
+      <p:ext uri="{BB962C8B-B14F-4D97-AF65-F5344CB8AC3E}">
+        <p14:creationId xmlns:p14="http://schemas.microsoft.com/office/powerpoint/2010/main" val="16051024"/>
       </p:ext>
     </p:extLst>
   </p:cSld>

</xml_diff>

<commit_message>
Added changes from the subs and worked through a couple things
</commit_message>
<xml_diff>
--- a/getting-started-with-github-actions.pptx
+++ b/getting-started-with-github-actions.pptx
@@ -6330,7 +6330,7 @@
           <a:p>
             <a:fld id="{483CF091-EDBF-4084-AB7D-074BB5D46B80}" type="datetimeFigureOut">
               <a:rPr lang="en-US" smtClean="0"/>
-              <a:t>5/14/2023</a:t>
+              <a:t>5/15/2023</a:t>
             </a:fld>
             <a:endParaRPr lang="en-US"/>
           </a:p>
@@ -6935,6 +6935,21 @@
               <a:t>https://docs.github.com/en/actions/creating-actions/about-custom-actions</a:t>
             </a:r>
           </a:p>
+          <a:p>
+            <a:endParaRPr lang="en-US" dirty="0"/>
+          </a:p>
+          <a:p>
+            <a:r>
+              <a:rPr lang="en-US" dirty="0"/>
+              <a:t>Actions are open source:</a:t>
+            </a:r>
+          </a:p>
+          <a:p>
+            <a:r>
+              <a:rPr lang="en-US" dirty="0"/>
+              <a:t>https://github.com/actions/checkout/tree/v3</a:t>
+            </a:r>
+          </a:p>
         </p:txBody>
       </p:sp>
       <p:sp>
@@ -7041,16 +7056,24 @@
             <a:endParaRPr lang="en-US" dirty="0"/>
           </a:p>
           <a:p>
-            <a:endParaRPr lang="en-US" dirty="0"/>
-          </a:p>
-          <a:p>
             <a:r>
               <a:rPr lang="en-US" dirty="0"/>
-              <a:t>Self-Hosted:</a:t>
-            </a:r>
-          </a:p>
-          <a:p>
-            <a:endParaRPr lang="en-US" dirty="0"/>
+              <a:t>Actions are </a:t>
+            </a:r>
+            <a:r>
+              <a:rPr lang="en-US" dirty="0" err="1"/>
+              <a:t>OpenSource</a:t>
+            </a:r>
+            <a:r>
+              <a:rPr lang="en-US" dirty="0"/>
+              <a:t>:  Show page….</a:t>
+            </a:r>
+          </a:p>
+          <a:p>
+            <a:r>
+              <a:rPr lang="en-US" dirty="0"/>
+              <a:t>https://github.com/actions/checkout/tree/v3</a:t>
+            </a:r>
           </a:p>
         </p:txBody>
       </p:sp>
@@ -7192,6 +7215,132 @@
 </p:notes>
 </file>
 
+<file path=ppt/notesSlides/notesSlide14.xml><?xml version="1.0" encoding="utf-8"?>
+<p:notes xmlns:a="http://schemas.openxmlformats.org/drawingml/2006/main" xmlns:r="http://schemas.openxmlformats.org/officeDocument/2006/relationships" xmlns:p="http://schemas.openxmlformats.org/presentationml/2006/main">
+  <p:cSld>
+    <p:spTree>
+      <p:nvGrpSpPr>
+        <p:cNvPr id="1" name=""/>
+        <p:cNvGrpSpPr/>
+        <p:nvPr/>
+      </p:nvGrpSpPr>
+      <p:grpSpPr>
+        <a:xfrm>
+          <a:off x="0" y="0"/>
+          <a:ext cx="0" cy="0"/>
+          <a:chOff x="0" y="0"/>
+          <a:chExt cx="0" cy="0"/>
+        </a:xfrm>
+      </p:grpSpPr>
+      <p:sp>
+        <p:nvSpPr>
+          <p:cNvPr id="2" name="Slide Image Placeholder 1"/>
+          <p:cNvSpPr>
+            <a:spLocks noGrp="1" noRot="1" noChangeAspect="1"/>
+          </p:cNvSpPr>
+          <p:nvPr>
+            <p:ph type="sldImg"/>
+          </p:nvPr>
+        </p:nvSpPr>
+        <p:spPr/>
+      </p:sp>
+      <p:sp>
+        <p:nvSpPr>
+          <p:cNvPr id="3" name="Notes Placeholder 2"/>
+          <p:cNvSpPr>
+            <a:spLocks noGrp="1"/>
+          </p:cNvSpPr>
+          <p:nvPr>
+            <p:ph type="body" idx="1"/>
+          </p:nvPr>
+        </p:nvSpPr>
+        <p:spPr/>
+        <p:txBody>
+          <a:bodyPr/>
+          <a:lstStyle/>
+          <a:p>
+            <a:r>
+              <a:rPr lang="en-US" dirty="0"/>
+              <a:t>Azure – Azure Key Vault</a:t>
+            </a:r>
+          </a:p>
+          <a:p>
+            <a:r>
+              <a:rPr lang="en-US" dirty="0"/>
+              <a:t>AWS – KMS – Key manager service</a:t>
+            </a:r>
+          </a:p>
+          <a:p>
+            <a:r>
+              <a:rPr lang="en-US" dirty="0"/>
+              <a:t>GitHub secrets </a:t>
+            </a:r>
+          </a:p>
+          <a:p>
+            <a:pPr marL="171450" indent="-171450">
+              <a:buFontTx/>
+              <a:buChar char="-"/>
+            </a:pPr>
+            <a:r>
+              <a:rPr lang="en-US" dirty="0"/>
+              <a:t>Per repo</a:t>
+            </a:r>
+          </a:p>
+          <a:p>
+            <a:pPr marL="171450" indent="-171450">
+              <a:buFontTx/>
+              <a:buChar char="-"/>
+            </a:pPr>
+            <a:r>
+              <a:rPr lang="en-US" dirty="0"/>
+              <a:t>Per org</a:t>
+            </a:r>
+          </a:p>
+          <a:p>
+            <a:pPr marL="171450" indent="-171450">
+              <a:buFontTx/>
+              <a:buChar char="-"/>
+            </a:pPr>
+            <a:endParaRPr lang="en-US" dirty="0"/>
+          </a:p>
+        </p:txBody>
+      </p:sp>
+      <p:sp>
+        <p:nvSpPr>
+          <p:cNvPr id="4" name="Slide Number Placeholder 3"/>
+          <p:cNvSpPr>
+            <a:spLocks noGrp="1"/>
+          </p:cNvSpPr>
+          <p:nvPr>
+            <p:ph type="sldNum" sz="quarter" idx="5"/>
+          </p:nvPr>
+        </p:nvSpPr>
+        <p:spPr/>
+        <p:txBody>
+          <a:bodyPr/>
+          <a:lstStyle/>
+          <a:p>
+            <a:fld id="{B8415318-9559-4C74-BDAD-E20CD3078992}" type="slidenum">
+              <a:rPr lang="en-US" smtClean="0"/>
+              <a:t>16</a:t>
+            </a:fld>
+            <a:endParaRPr lang="en-US"/>
+          </a:p>
+        </p:txBody>
+      </p:sp>
+    </p:spTree>
+    <p:extLst>
+      <p:ext uri="{BB962C8B-B14F-4D97-AF65-F5344CB8AC3E}">
+        <p14:creationId xmlns:p14="http://schemas.microsoft.com/office/powerpoint/2010/main" val="121553197"/>
+      </p:ext>
+    </p:extLst>
+  </p:cSld>
+  <p:clrMapOvr>
+    <a:masterClrMapping/>
+  </p:clrMapOvr>
+</p:notes>
+</file>
+
 <file path=ppt/notesSlides/notesSlide2.xml><?xml version="1.0" encoding="utf-8"?>
 <p:notes xmlns:a="http://schemas.openxmlformats.org/drawingml/2006/main" xmlns:r="http://schemas.openxmlformats.org/officeDocument/2006/relationships" xmlns:p="http://schemas.openxmlformats.org/presentationml/2006/main">
   <p:cSld>
@@ -7305,6 +7454,29 @@
                 <a:latin typeface="-apple-system"/>
               </a:rPr>
               <a:t>GitHub provides Linux, Windows, and macOS virtual machines to run your workflows, or you can host your own self-hosted runners in your own data center or cloud infrastructure.</a:t>
+            </a:r>
+          </a:p>
+          <a:p>
+            <a:pPr algn="l"/>
+            <a:endParaRPr lang="en-US" b="0" i="0" dirty="0">
+              <a:solidFill>
+                <a:srgbClr val="1F2328"/>
+              </a:solidFill>
+              <a:effectLst/>
+              <a:latin typeface="-apple-system"/>
+            </a:endParaRPr>
+          </a:p>
+          <a:p>
+            <a:pPr algn="l"/>
+            <a:r>
+              <a:rPr lang="en-US" b="0" i="0" dirty="0">
+                <a:solidFill>
+                  <a:srgbClr val="1F2328"/>
+                </a:solidFill>
+                <a:effectLst/>
+                <a:latin typeface="-apple-system"/>
+              </a:rPr>
+              <a:t>GitHub CLI all the things!</a:t>
             </a:r>
           </a:p>
           <a:p>
@@ -7687,45 +7859,9 @@
             </a:r>
           </a:p>
           <a:p>
-            <a:pPr marL="171450" indent="-171450" algn="l">
+            <a:pPr marL="0" indent="0" algn="l">
               <a:buFontTx/>
-              <a:buChar char="-"/>
-            </a:pPr>
-            <a:r>
-              <a:rPr lang="en-US" b="0" i="0" dirty="0">
-                <a:solidFill>
-                  <a:srgbClr val="1F2328"/>
-                </a:solidFill>
-                <a:effectLst/>
-                <a:latin typeface="-apple-system"/>
-              </a:rPr>
-              <a:t>Use the </a:t>
-            </a:r>
-            <a:r>
-              <a:rPr lang="en-US" b="0" i="0" dirty="0" err="1">
-                <a:solidFill>
-                  <a:srgbClr val="1F2328"/>
-                </a:solidFill>
-                <a:effectLst/>
-                <a:latin typeface="-apple-system"/>
-              </a:rPr>
-              <a:t>Github</a:t>
-            </a:r>
-            <a:r>
-              <a:rPr lang="en-US" b="0" i="0" dirty="0">
-                <a:solidFill>
-                  <a:srgbClr val="1F2328"/>
-                </a:solidFill>
-                <a:effectLst/>
-                <a:latin typeface="-apple-system"/>
-              </a:rPr>
-              <a:t> API to “schedule” a job by having something else post to the API</a:t>
-            </a:r>
-          </a:p>
-          <a:p>
-            <a:pPr marL="171450" indent="-171450" algn="l">
-              <a:buFontTx/>
-              <a:buChar char="-"/>
+              <a:buNone/>
             </a:pPr>
             <a:endParaRPr lang="en-US" b="0" i="0" dirty="0">
               <a:solidFill>
@@ -8293,11 +8429,8 @@
           <a:p>
             <a:r>
               <a:rPr lang="en-US" dirty="0"/>
-              <a:t>https://docs.github.com/en/rest/repos/repos?apiVersion=2022-11-28#create-a-repository-dispatch-event</a:t>
-            </a:r>
-          </a:p>
-          <a:p>
-            <a:endParaRPr lang="en-US" dirty="0"/>
+              <a:t>https://docs.github.com/en/actions/using-workflows/workflow-syntax-for-github-actions#onschedule</a:t>
+            </a:r>
           </a:p>
           <a:p>
             <a:r>
@@ -8306,6 +8439,9 @@
             </a:r>
           </a:p>
           <a:p>
+            <a:endParaRPr lang="en-US" dirty="0"/>
+          </a:p>
+          <a:p>
             <a:r>
               <a:rPr lang="en-US" dirty="0"/>
               <a:t>Add “</a:t>
@@ -8334,6 +8470,12 @@
               <a:rPr lang="en-US" dirty="0"/>
               <a:t>.</a:t>
             </a:r>
+          </a:p>
+          <a:p>
+            <a:endParaRPr lang="en-US" dirty="0"/>
+          </a:p>
+          <a:p>
+            <a:endParaRPr lang="en-US" dirty="0"/>
           </a:p>
         </p:txBody>
       </p:sp>
@@ -9073,7 +9215,7 @@
           <a:p>
             <a:fld id="{3CADBD16-5BFB-4D9F-9646-C75D1B53BBB6}" type="datetimeFigureOut">
               <a:rPr lang="en-US" smtClean="0"/>
-              <a:t>5/14/2023</a:t>
+              <a:t>5/15/2023</a:t>
             </a:fld>
             <a:endParaRPr lang="en-US"/>
           </a:p>
@@ -9314,7 +9456,7 @@
           <a:p>
             <a:fld id="{3CADBD16-5BFB-4D9F-9646-C75D1B53BBB6}" type="datetimeFigureOut">
               <a:rPr lang="en-US" smtClean="0"/>
-              <a:t>5/14/2023</a:t>
+              <a:t>5/15/2023</a:t>
             </a:fld>
             <a:endParaRPr lang="en-US"/>
           </a:p>
@@ -9522,7 +9664,7 @@
           <a:p>
             <a:fld id="{3CADBD16-5BFB-4D9F-9646-C75D1B53BBB6}" type="datetimeFigureOut">
               <a:rPr lang="en-US" smtClean="0"/>
-              <a:t>5/14/2023</a:t>
+              <a:t>5/15/2023</a:t>
             </a:fld>
             <a:endParaRPr lang="en-US"/>
           </a:p>
@@ -9720,7 +9862,7 @@
           <a:p>
             <a:fld id="{3CADBD16-5BFB-4D9F-9646-C75D1B53BBB6}" type="datetimeFigureOut">
               <a:rPr lang="en-US" smtClean="0"/>
-              <a:t>5/14/2023</a:t>
+              <a:t>5/15/2023</a:t>
             </a:fld>
             <a:endParaRPr lang="en-US"/>
           </a:p>
@@ -9997,7 +10139,7 @@
           <a:p>
             <a:fld id="{3CADBD16-5BFB-4D9F-9646-C75D1B53BBB6}" type="datetimeFigureOut">
               <a:rPr lang="en-US" smtClean="0"/>
-              <a:t>5/14/2023</a:t>
+              <a:t>5/15/2023</a:t>
             </a:fld>
             <a:endParaRPr lang="en-US"/>
           </a:p>
@@ -10262,7 +10404,7 @@
           <a:p>
             <a:fld id="{3CADBD16-5BFB-4D9F-9646-C75D1B53BBB6}" type="datetimeFigureOut">
               <a:rPr lang="en-US" smtClean="0"/>
-              <a:t>5/14/2023</a:t>
+              <a:t>5/15/2023</a:t>
             </a:fld>
             <a:endParaRPr lang="en-US"/>
           </a:p>
@@ -10678,7 +10820,7 @@
           <a:p>
             <a:fld id="{3CADBD16-5BFB-4D9F-9646-C75D1B53BBB6}" type="datetimeFigureOut">
               <a:rPr lang="en-US" smtClean="0"/>
-              <a:t>5/14/2023</a:t>
+              <a:t>5/15/2023</a:t>
             </a:fld>
             <a:endParaRPr lang="en-US"/>
           </a:p>
@@ -10828,7 +10970,7 @@
           <a:p>
             <a:fld id="{3CADBD16-5BFB-4D9F-9646-C75D1B53BBB6}" type="datetimeFigureOut">
               <a:rPr lang="en-US" smtClean="0"/>
-              <a:t>5/14/2023</a:t>
+              <a:t>5/15/2023</a:t>
             </a:fld>
             <a:endParaRPr lang="en-US"/>
           </a:p>
@@ -10941,7 +11083,7 @@
           <a:p>
             <a:fld id="{3CADBD16-5BFB-4D9F-9646-C75D1B53BBB6}" type="datetimeFigureOut">
               <a:rPr lang="en-US" smtClean="0"/>
-              <a:t>5/14/2023</a:t>
+              <a:t>5/15/2023</a:t>
             </a:fld>
             <a:endParaRPr lang="en-US"/>
           </a:p>
@@ -11257,7 +11399,7 @@
           <a:p>
             <a:fld id="{3CADBD16-5BFB-4D9F-9646-C75D1B53BBB6}" type="datetimeFigureOut">
               <a:rPr lang="en-US" smtClean="0"/>
-              <a:t>5/14/2023</a:t>
+              <a:t>5/15/2023</a:t>
             </a:fld>
             <a:endParaRPr lang="en-US"/>
           </a:p>
@@ -11508,7 +11650,7 @@
           <a:p>
             <a:fld id="{3CADBD16-5BFB-4D9F-9646-C75D1B53BBB6}" type="datetimeFigureOut">
               <a:rPr lang="en-US" smtClean="0"/>
-              <a:t>5/14/2023</a:t>
+              <a:t>5/15/2023</a:t>
             </a:fld>
             <a:endParaRPr lang="en-US"/>
           </a:p>
@@ -12017,7 +12159,7 @@
             <a:fld id="{3CADBD16-5BFB-4D9F-9646-C75D1B53BBB6}" type="datetimeFigureOut">
               <a:rPr lang="en-US" smtClean="0"/>
               <a:pPr/>
-              <a:t>5/14/2023</a:t>
+              <a:t>5/15/2023</a:t>
             </a:fld>
             <a:endParaRPr lang="en-US" dirty="0"/>
           </a:p>
@@ -12573,8 +12715,8 @@
         </p:nvSpPr>
         <p:spPr>
           <a:xfrm>
-            <a:off x="1143001" y="4360719"/>
-            <a:ext cx="2679356" cy="1465118"/>
+            <a:off x="444501" y="3537956"/>
+            <a:ext cx="4521200" cy="2037344"/>
           </a:xfrm>
         </p:spPr>
         <p:txBody>
@@ -12583,7 +12725,35 @@
           </a:bodyPr>
           <a:lstStyle/>
           <a:p>
-            <a:endParaRPr lang="en-US"/>
+            <a:pPr algn="l"/>
+            <a:r>
+              <a:rPr lang="en-US" sz="1800" dirty="0"/>
+              <a:t>Harold Pulcher		</a:t>
+            </a:r>
+          </a:p>
+          <a:p>
+            <a:pPr algn="l"/>
+            <a:r>
+              <a:rPr lang="en-US" sz="1800" dirty="0"/>
+              <a:t>harold.pulcher@improving.com</a:t>
+            </a:r>
+          </a:p>
+          <a:p>
+            <a:pPr algn="l"/>
+            <a:r>
+              <a:rPr lang="en-US" sz="1800" dirty="0"/>
+              <a:t>@haroldpulcher		</a:t>
+            </a:r>
+          </a:p>
+          <a:p>
+            <a:pPr algn="l"/>
+            <a:r>
+              <a:rPr lang="en-US" sz="1800" dirty="0"/>
+              <a:t>https://bit.ly/hobby-helps-profession</a:t>
+            </a:r>
+          </a:p>
+          <a:p>
+            <a:endParaRPr lang="en-US" dirty="0"/>
           </a:p>
         </p:txBody>
       </p:sp>
@@ -14259,10 +14429,10 @@
       </p:grpSpPr>
       <p:sp useBgFill="1">
         <p:nvSpPr>
-          <p:cNvPr id="8" name="Rectangle 7">
+          <p:cNvPr id="25" name="Rectangle 24">
             <a:extLst>
               <a:ext uri="{FF2B5EF4-FFF2-40B4-BE49-F238E27FC236}">
-                <a16:creationId xmlns:a16="http://schemas.microsoft.com/office/drawing/2014/main" id="{AB20E7A4-EC2C-47C8-BE55-65771E3F2EDA}"/>
+                <a16:creationId xmlns:a16="http://schemas.microsoft.com/office/drawing/2014/main" id="{685B57F6-59DE-4274-A37C-F47FE4E42EEF}"/>
               </a:ext>
               <a:ext uri="{C183D7F6-B498-43B3-948B-1728B52AA6E4}">
                 <adec:decorative xmlns:adec="http://schemas.microsoft.com/office/drawing/2017/decorative" val="1"/>
@@ -14333,12 +14503,78 @@
           </a:p>
         </p:txBody>
       </p:sp>
+      <p:pic>
+        <p:nvPicPr>
+          <p:cNvPr id="14" name="Picture 13" descr="Piles of paperwork">
+            <a:extLst>
+              <a:ext uri="{FF2B5EF4-FFF2-40B4-BE49-F238E27FC236}">
+                <a16:creationId xmlns:a16="http://schemas.microsoft.com/office/drawing/2014/main" id="{642AD618-66DF-C79B-0134-5031BD6ABA88}"/>
+              </a:ext>
+            </a:extLst>
+          </p:cNvPr>
+          <p:cNvPicPr>
+            <a:picLocks noChangeAspect="1"/>
+          </p:cNvPicPr>
+          <p:nvPr/>
+        </p:nvPicPr>
+        <p:blipFill rotWithShape="1">
+          <a:blip r:embed="rId3"/>
+          <a:srcRect l="495"/>
+          <a:stretch/>
+        </p:blipFill>
+        <p:spPr>
+          <a:xfrm>
+            <a:off x="3093268" y="10"/>
+            <a:ext cx="9098732" cy="6857990"/>
+          </a:xfrm>
+          <a:custGeom>
+            <a:avLst/>
+            <a:gdLst/>
+            <a:ahLst/>
+            <a:cxnLst/>
+            <a:rect l="l" t="t" r="r" b="b"/>
+            <a:pathLst>
+              <a:path w="9098732" h="6858000">
+                <a:moveTo>
+                  <a:pt x="6010592" y="0"/>
+                </a:moveTo>
+                <a:lnTo>
+                  <a:pt x="8235629" y="4"/>
+                </a:lnTo>
+                <a:cubicBezTo>
+                  <a:pt x="8235629" y="3"/>
+                  <a:pt x="8235630" y="3"/>
+                  <a:pt x="8235630" y="2"/>
+                </a:cubicBezTo>
+                <a:lnTo>
+                  <a:pt x="9098732" y="0"/>
+                </a:lnTo>
+                <a:lnTo>
+                  <a:pt x="9098732" y="6858000"/>
+                </a:lnTo>
+                <a:lnTo>
+                  <a:pt x="0" y="6858000"/>
+                </a:lnTo>
+                <a:lnTo>
+                  <a:pt x="6010589" y="4"/>
+                </a:lnTo>
+                <a:cubicBezTo>
+                  <a:pt x="6010589" y="3"/>
+                  <a:pt x="6010590" y="3"/>
+                  <a:pt x="6010590" y="2"/>
+                </a:cubicBezTo>
+                <a:close/>
+              </a:path>
+            </a:pathLst>
+          </a:custGeom>
+        </p:spPr>
+      </p:pic>
       <p:sp>
         <p:nvSpPr>
-          <p:cNvPr id="10" name="Freeform: Shape 9">
+          <p:cNvPr id="27" name="Freeform: Shape 26">
             <a:extLst>
               <a:ext uri="{FF2B5EF4-FFF2-40B4-BE49-F238E27FC236}">
-                <a16:creationId xmlns:a16="http://schemas.microsoft.com/office/drawing/2014/main" id="{798B7D97-1FE0-4BA9-801E-2CE19FD25C77}"/>
+                <a16:creationId xmlns:a16="http://schemas.microsoft.com/office/drawing/2014/main" id="{C8C63406-9171-4282-BAAB-2DDC6831F0E6}"/>
               </a:ext>
               <a:ext uri="{C183D7F6-B498-43B3-948B-1728B52AA6E4}">
                 <adec:decorative xmlns:adec="http://schemas.microsoft.com/office/drawing/2017/decorative" val="1"/>
@@ -14358,7 +14594,7 @@
         </p:nvSpPr>
         <p:spPr>
           <a:xfrm>
-            <a:off x="881660" y="0"/>
+            <a:off x="3090295" y="-2"/>
             <a:ext cx="8239927" cy="6858000"/>
           </a:xfrm>
           <a:custGeom>
@@ -14408,7 +14644,9 @@
             </a:pathLst>
           </a:custGeom>
           <a:solidFill>
-            <a:schemeClr val="bg2"/>
+            <a:schemeClr val="bg2">
+              <a:alpha val="60000"/>
+            </a:schemeClr>
           </a:solidFill>
           <a:ln w="12700" cap="flat" cmpd="sng" algn="ctr">
             <a:noFill/>
@@ -14460,25 +14698,25 @@
         </p:nvSpPr>
         <p:spPr>
           <a:xfrm>
-            <a:off x="1143000" y="1207441"/>
-            <a:ext cx="3824111" cy="1916773"/>
+            <a:off x="435996" y="301437"/>
+            <a:ext cx="5920740" cy="1360898"/>
           </a:xfrm>
         </p:spPr>
         <p:txBody>
-          <a:bodyPr anchor="t">
+          <a:bodyPr>
             <a:normAutofit/>
           </a:bodyPr>
           <a:lstStyle/>
           <a:p>
             <a:r>
-              <a:rPr lang="en-US" b="0" i="0">
+              <a:rPr lang="en-US" b="0" i="0" dirty="0">
                 <a:effectLst/>
                 <a:latin typeface="Söhne"/>
               </a:rPr>
               <a:t>Custom actions</a:t>
             </a:r>
             <a:br>
-              <a:rPr lang="en-US" b="0" i="0">
+              <a:rPr lang="en-US" b="0" i="0" dirty="0">
                 <a:effectLst/>
                 <a:latin typeface="Söhne"/>
               </a:rPr>
@@ -14505,153 +14743,110 @@
         </p:nvSpPr>
         <p:spPr>
           <a:xfrm>
-            <a:off x="6478384" y="2489201"/>
-            <a:ext cx="4570615" cy="3225798"/>
+            <a:off x="435996" y="1760529"/>
+            <a:ext cx="5308598" cy="3840171"/>
           </a:xfrm>
         </p:spPr>
         <p:txBody>
-          <a:bodyPr anchor="b">
+          <a:bodyPr>
             <a:normAutofit/>
           </a:bodyPr>
           <a:lstStyle/>
           <a:p>
-            <a:pPr algn="r">
+            <a:pPr>
               <a:lnSpc>
                 <a:spcPct val="110000"/>
               </a:lnSpc>
             </a:pPr>
             <a:r>
-              <a:rPr lang="en-US" sz="1400"/>
+              <a:rPr lang="en-US" sz="1700" dirty="0"/>
               <a:t>Docker container</a:t>
             </a:r>
           </a:p>
           <a:p>
-            <a:pPr algn="r">
+            <a:pPr>
               <a:lnSpc>
                 <a:spcPct val="110000"/>
               </a:lnSpc>
             </a:pPr>
             <a:r>
-              <a:rPr lang="en-US" sz="1400"/>
+              <a:rPr lang="en-US" sz="1700" dirty="0"/>
               <a:t>JavaScript</a:t>
             </a:r>
           </a:p>
           <a:p>
-            <a:pPr algn="r">
+            <a:pPr>
               <a:lnSpc>
                 <a:spcPct val="110000"/>
               </a:lnSpc>
             </a:pPr>
             <a:r>
-              <a:rPr lang="en-US" sz="1400"/>
+              <a:rPr lang="en-US" sz="1700" dirty="0"/>
               <a:t>Composite Actions</a:t>
             </a:r>
           </a:p>
           <a:p>
-            <a:pPr algn="r">
+            <a:pPr>
               <a:lnSpc>
                 <a:spcPct val="110000"/>
               </a:lnSpc>
             </a:pPr>
-            <a:endParaRPr lang="en-US" sz="1400"/>
-          </a:p>
-          <a:p>
-            <a:pPr algn="r">
+            <a:endParaRPr lang="en-US" sz="1700" dirty="0"/>
+          </a:p>
+          <a:p>
+            <a:pPr>
               <a:lnSpc>
                 <a:spcPct val="110000"/>
               </a:lnSpc>
             </a:pPr>
             <a:r>
-              <a:rPr lang="en-US" sz="1400"/>
+              <a:rPr lang="en-US" sz="1700" dirty="0"/>
               <a:t>Each requires an “</a:t>
             </a:r>
             <a:r>
-              <a:rPr lang="en-US" sz="1400" err="1"/>
+              <a:rPr lang="en-US" sz="1700" dirty="0" err="1"/>
               <a:t>action.yaml</a:t>
             </a:r>
             <a:r>
-              <a:rPr lang="en-US" sz="1400"/>
+              <a:rPr lang="en-US" sz="1700" dirty="0"/>
               <a:t>” file for all the inputs.</a:t>
             </a:r>
           </a:p>
           <a:p>
-            <a:pPr marL="0" indent="0" algn="r">
+            <a:pPr marL="0" indent="0">
               <a:lnSpc>
                 <a:spcPct val="110000"/>
               </a:lnSpc>
               <a:buNone/>
             </a:pPr>
-            <a:r>
-              <a:rPr lang="en-US" sz="1400"/>
-              <a:t>Documentation:</a:t>
-            </a:r>
-          </a:p>
-          <a:p>
-            <a:pPr marL="0" indent="0" algn="r">
+            <a:endParaRPr lang="en-US" sz="1700" dirty="0"/>
+          </a:p>
+          <a:p>
+            <a:pPr marL="0" indent="0">
               <a:lnSpc>
                 <a:spcPct val="110000"/>
               </a:lnSpc>
               <a:buNone/>
             </a:pPr>
             <a:r>
-              <a:rPr lang="en-US" sz="1400"/>
+              <a:rPr lang="en-US" sz="1700" dirty="0"/>
+              <a:t>Documentation:</a:t>
+            </a:r>
+          </a:p>
+          <a:p>
+            <a:pPr marL="0" indent="0">
+              <a:lnSpc>
+                <a:spcPct val="110000"/>
+              </a:lnSpc>
+              <a:buNone/>
+            </a:pPr>
+            <a:r>
+              <a:rPr lang="en-US" sz="1700" dirty="0"/>
               <a:t>https://docs.github.com/en/actions/creating-actions/about-custom-actions</a:t>
             </a:r>
           </a:p>
         </p:txBody>
       </p:sp>
-      <p:cxnSp>
-        <p:nvCxnSpPr>
-          <p:cNvPr id="12" name="Straight Connector 11">
-            <a:extLst>
-              <a:ext uri="{FF2B5EF4-FFF2-40B4-BE49-F238E27FC236}">
-                <a16:creationId xmlns:a16="http://schemas.microsoft.com/office/drawing/2014/main" id="{1766FD2F-248A-4AA1-8078-E26D6E690BB9}"/>
-              </a:ext>
-              <a:ext uri="{C183D7F6-B498-43B3-948B-1728B52AA6E4}">
-                <adec:decorative xmlns:adec="http://schemas.microsoft.com/office/drawing/2017/decorative" val="1"/>
-              </a:ext>
-            </a:extLst>
-          </p:cNvPr>
-          <p:cNvCxnSpPr>
-            <a:cxnSpLocks noGrp="1" noRot="1" noChangeAspect="1" noMove="1" noResize="1" noEditPoints="1" noAdjustHandles="1" noChangeArrowheads="1" noChangeShapeType="1"/>
-          </p:cNvCxnSpPr>
-          <p:nvPr>
-            <p:extLst>
-              <p:ext uri="{386F3935-93C4-4BCD-93E2-E3B085C9AB24}">
-                <p16:designElem xmlns:p16="http://schemas.microsoft.com/office/powerpoint/2015/main" val="1"/>
-              </p:ext>
-            </p:extLst>
-          </p:nvPr>
-        </p:nvCxnSpPr>
-        <p:spPr>
-          <a:xfrm>
-            <a:off x="1233837" y="6172200"/>
-            <a:ext cx="9760638" cy="0"/>
-          </a:xfrm>
-          <a:prstGeom prst="line">
-            <a:avLst/>
-          </a:prstGeom>
-          <a:ln w="12700">
-            <a:solidFill>
-              <a:schemeClr val="tx1"/>
-            </a:solidFill>
-          </a:ln>
-        </p:spPr>
-        <p:style>
-          <a:lnRef idx="1">
-            <a:schemeClr val="accent1"/>
-          </a:lnRef>
-          <a:fillRef idx="0">
-            <a:schemeClr val="accent1"/>
-          </a:fillRef>
-          <a:effectRef idx="0">
-            <a:schemeClr val="accent1"/>
-          </a:effectRef>
-          <a:fontRef idx="minor">
-            <a:schemeClr val="tx1"/>
-          </a:fontRef>
-        </p:style>
-      </p:cxnSp>
     </p:spTree>
     <p:extLst>
       <p:ext uri="{BB962C8B-B14F-4D97-AF65-F5344CB8AC3E}">
@@ -16947,13 +17142,13 @@
           <p:nvPr/>
         </p:nvPicPr>
         <p:blipFill>
-          <a:blip r:embed="rId2">
+          <a:blip r:embed="rId3">
             <a:extLst>
               <a:ext uri="{28A0092B-C50C-407E-A947-70E740481C1C}">
                 <a14:useLocalDpi xmlns:a14="http://schemas.microsoft.com/office/drawing/2010/main" val="0"/>
               </a:ext>
               <a:ext uri="{96DAC541-7B7A-43D3-8B79-37D633B846F1}">
-                <asvg:svgBlip xmlns:asvg="http://schemas.microsoft.com/office/drawing/2016/SVG/main" r:embed="rId3"/>
+                <asvg:svgBlip xmlns:asvg="http://schemas.microsoft.com/office/drawing/2016/SVG/main" r:embed="rId4"/>
               </a:ext>
             </a:extLst>
           </a:blip>
@@ -18158,6 +18353,12 @@
             <a:r>
               <a:rPr lang="en-US" dirty="0"/>
               <a:t>Hosted and non-hosted Agents/Runners</a:t>
+            </a:r>
+          </a:p>
+          <a:p>
+            <a:r>
+              <a:rPr lang="en-US" dirty="0"/>
+              <a:t>Workflow definitions live with the code</a:t>
             </a:r>
           </a:p>
         </p:txBody>

</xml_diff>

<commit_message>
getting ready for the presentation
</commit_message>
<xml_diff>
--- a/getting-started-with-github-actions.pptx
+++ b/getting-started-with-github-actions.pptx
@@ -6330,7 +6330,7 @@
           <a:p>
             <a:fld id="{483CF091-EDBF-4084-AB7D-074BB5D46B80}" type="datetimeFigureOut">
               <a:rPr lang="en-US" smtClean="0"/>
-              <a:t>5/15/2023</a:t>
+              <a:t>5/16/2023</a:t>
             </a:fld>
             <a:endParaRPr lang="en-US"/>
           </a:p>
@@ -6764,6 +6764,18 @@
           <a:p>
             <a:endParaRPr lang="en-US" dirty="0"/>
           </a:p>
+          <a:p>
+            <a:r>
+              <a:rPr lang="en-US" dirty="0"/>
+              <a:t>Just got back to the tab where you clicked… there should be fun stuff there.</a:t>
+            </a:r>
+          </a:p>
+          <a:p>
+            <a:r>
+              <a:rPr lang="en-US" dirty="0"/>
+              <a:t>URL-8: https://github.com/pulcher/TalkingHead/actions</a:t>
+            </a:r>
+          </a:p>
         </p:txBody>
       </p:sp>
       <p:sp>
@@ -6932,7 +6944,7 @@
           <a:p>
             <a:r>
               <a:rPr lang="en-US" dirty="0"/>
-              <a:t>https://docs.github.com/en/actions/creating-actions/about-custom-actions</a:t>
+              <a:t>URL-9: https://docs.github.com/en/actions/creating-actions/about-custom-actions</a:t>
             </a:r>
           </a:p>
           <a:p>
@@ -6947,7 +6959,7 @@
           <a:p>
             <a:r>
               <a:rPr lang="en-US" dirty="0"/>
-              <a:t>https://github.com/actions/checkout/tree/v3</a:t>
+              <a:t>URL-10: https://github.com/actions/checkout/tree/v3</a:t>
             </a:r>
           </a:p>
         </p:txBody>
@@ -7052,29 +7064,6 @@
               <a:t>https://docs.github.com/en/actions/using-github-hosted-runners/about-github-hosted-runners</a:t>
             </a:r>
           </a:p>
-          <a:p>
-            <a:endParaRPr lang="en-US" dirty="0"/>
-          </a:p>
-          <a:p>
-            <a:r>
-              <a:rPr lang="en-US" dirty="0"/>
-              <a:t>Actions are </a:t>
-            </a:r>
-            <a:r>
-              <a:rPr lang="en-US" dirty="0" err="1"/>
-              <a:t>OpenSource</a:t>
-            </a:r>
-            <a:r>
-              <a:rPr lang="en-US" dirty="0"/>
-              <a:t>:  Show page….</a:t>
-            </a:r>
-          </a:p>
-          <a:p>
-            <a:r>
-              <a:rPr lang="en-US" dirty="0"/>
-              <a:t>https://github.com/actions/checkout/tree/v3</a:t>
-            </a:r>
-          </a:p>
         </p:txBody>
       </p:sp>
       <p:sp>
@@ -7168,7 +7157,7 @@
           <a:p>
             <a:r>
               <a:rPr lang="en-US" dirty="0"/>
-              <a:t>https://docs.github.com/en/actions/hosting-your-own-runners/managing-self-hosted-runners/about-self-hosted-runners</a:t>
+              <a:t>URL-11: https://docs.github.com/en/actions/hosting-your-own-runners/managing-self-hosted-runners/about-self-hosted-runners</a:t>
             </a:r>
           </a:p>
           <a:p>
@@ -7341,6 +7330,90 @@
 </p:notes>
 </file>
 
+<file path=ppt/notesSlides/notesSlide15.xml><?xml version="1.0" encoding="utf-8"?>
+<p:notes xmlns:a="http://schemas.openxmlformats.org/drawingml/2006/main" xmlns:r="http://schemas.openxmlformats.org/officeDocument/2006/relationships" xmlns:p="http://schemas.openxmlformats.org/presentationml/2006/main">
+  <p:cSld>
+    <p:spTree>
+      <p:nvGrpSpPr>
+        <p:cNvPr id="1" name=""/>
+        <p:cNvGrpSpPr/>
+        <p:nvPr/>
+      </p:nvGrpSpPr>
+      <p:grpSpPr>
+        <a:xfrm>
+          <a:off x="0" y="0"/>
+          <a:ext cx="0" cy="0"/>
+          <a:chOff x="0" y="0"/>
+          <a:chExt cx="0" cy="0"/>
+        </a:xfrm>
+      </p:grpSpPr>
+      <p:sp>
+        <p:nvSpPr>
+          <p:cNvPr id="2" name="Slide Image Placeholder 1"/>
+          <p:cNvSpPr>
+            <a:spLocks noGrp="1" noRot="1" noChangeAspect="1"/>
+          </p:cNvSpPr>
+          <p:nvPr>
+            <p:ph type="sldImg"/>
+          </p:nvPr>
+        </p:nvSpPr>
+        <p:spPr/>
+      </p:sp>
+      <p:sp>
+        <p:nvSpPr>
+          <p:cNvPr id="3" name="Notes Placeholder 2"/>
+          <p:cNvSpPr>
+            <a:spLocks noGrp="1"/>
+          </p:cNvSpPr>
+          <p:nvPr>
+            <p:ph type="body" idx="1"/>
+          </p:nvPr>
+        </p:nvSpPr>
+        <p:spPr/>
+        <p:txBody>
+          <a:bodyPr/>
+          <a:lstStyle/>
+          <a:p>
+            <a:endParaRPr lang="en-US" dirty="0"/>
+          </a:p>
+        </p:txBody>
+      </p:sp>
+      <p:sp>
+        <p:nvSpPr>
+          <p:cNvPr id="4" name="Slide Number Placeholder 3"/>
+          <p:cNvSpPr>
+            <a:spLocks noGrp="1"/>
+          </p:cNvSpPr>
+          <p:nvPr>
+            <p:ph type="sldNum" sz="quarter" idx="5"/>
+          </p:nvPr>
+        </p:nvSpPr>
+        <p:spPr/>
+        <p:txBody>
+          <a:bodyPr/>
+          <a:lstStyle/>
+          <a:p>
+            <a:fld id="{B8415318-9559-4C74-BDAD-E20CD3078992}" type="slidenum">
+              <a:rPr lang="en-US" smtClean="0"/>
+              <a:t>17</a:t>
+            </a:fld>
+            <a:endParaRPr lang="en-US"/>
+          </a:p>
+        </p:txBody>
+      </p:sp>
+    </p:spTree>
+    <p:extLst>
+      <p:ext uri="{BB962C8B-B14F-4D97-AF65-F5344CB8AC3E}">
+        <p14:creationId xmlns:p14="http://schemas.microsoft.com/office/powerpoint/2010/main" val="2337778152"/>
+      </p:ext>
+    </p:extLst>
+  </p:cSld>
+  <p:clrMapOvr>
+    <a:masterClrMapping/>
+  </p:clrMapOvr>
+</p:notes>
+</file>
+
 <file path=ppt/notesSlides/notesSlide2.xml><?xml version="1.0" encoding="utf-8"?>
 <p:notes xmlns:a="http://schemas.openxmlformats.org/drawingml/2006/main" xmlns:r="http://schemas.openxmlformats.org/officeDocument/2006/relationships" xmlns:p="http://schemas.openxmlformats.org/presentationml/2006/main">
   <p:cSld>
@@ -8268,6 +8341,29 @@
             </a:r>
           </a:p>
           <a:p>
+            <a:pPr marL="0" marR="0" lvl="0" indent="0" algn="l" defTabSz="914400" rtl="0" eaLnBrk="1" fontAlgn="auto" latinLnBrk="0" hangingPunct="1">
+              <a:lnSpc>
+                <a:spcPct val="100000"/>
+              </a:lnSpc>
+              <a:spcBef>
+                <a:spcPts val="0"/>
+              </a:spcBef>
+              <a:spcAft>
+                <a:spcPts val="0"/>
+              </a:spcAft>
+              <a:buClrTx/>
+              <a:buSzTx/>
+              <a:buFontTx/>
+              <a:buNone/>
+              <a:tabLst/>
+              <a:defRPr/>
+            </a:pPr>
+            <a:r>
+              <a:rPr lang="en-US" dirty="0"/>
+              <a:t>URL-4: https://github.com/pulcher/BeerTracker</a:t>
+            </a:r>
+          </a:p>
+          <a:p>
             <a:endParaRPr lang="en-US" dirty="0"/>
           </a:p>
           <a:p>
@@ -8399,7 +8495,7 @@
           <a:p>
             <a:r>
               <a:rPr lang="en-US" dirty="0"/>
-              <a:t>https://docs.github.com/en/actions/using-workflows/workflow-syntax-for-github-actions#on</a:t>
+              <a:t>URL-1: https://docs.github.com/en/actions/using-workflows/workflow-syntax-for-github-actions#on</a:t>
             </a:r>
           </a:p>
           <a:p>
@@ -8414,7 +8510,7 @@
           <a:p>
             <a:r>
               <a:rPr lang="en-US" dirty="0"/>
-              <a:t>https://docs.github.com/en/rest/repos/repos?apiVersion=2022-11-28#create-a-repository-dispatch-event</a:t>
+              <a:t>URL-2: https://docs.github.com/en/rest/repos/repos?apiVersion=2022-11-28#create-a-repository-dispatch-event</a:t>
             </a:r>
           </a:p>
           <a:p>
@@ -8429,7 +8525,7 @@
           <a:p>
             <a:r>
               <a:rPr lang="en-US" dirty="0"/>
-              <a:t>https://docs.github.com/en/actions/using-workflows/workflow-syntax-for-github-actions#onschedule</a:t>
+              <a:t>URL-3: https://docs.github.com/en/actions/using-workflows/workflow-syntax-for-github-actions#onschedule</a:t>
             </a:r>
           </a:p>
           <a:p>
@@ -8472,10 +8568,70 @@
             </a:r>
           </a:p>
           <a:p>
+            <a:pPr marL="0" marR="0" lvl="0" indent="0" algn="l" defTabSz="914400" rtl="0" eaLnBrk="1" fontAlgn="auto" latinLnBrk="0" hangingPunct="1">
+              <a:lnSpc>
+                <a:spcPct val="100000"/>
+              </a:lnSpc>
+              <a:spcBef>
+                <a:spcPts val="0"/>
+              </a:spcBef>
+              <a:spcAft>
+                <a:spcPts val="0"/>
+              </a:spcAft>
+              <a:buClrTx/>
+              <a:buSzTx/>
+              <a:buFontTx/>
+              <a:buNone/>
+              <a:tabLst/>
+              <a:defRPr/>
+            </a:pPr>
+            <a:r>
+              <a:rPr lang="en-US" dirty="0"/>
+              <a:t>URL-8: Actions · https://github.com/pulcher/TalkingHead/actions</a:t>
+            </a:r>
+          </a:p>
+          <a:p>
+            <a:pPr marL="0" marR="0" lvl="0" indent="0" algn="l" defTabSz="914400" rtl="0" eaLnBrk="1" fontAlgn="auto" latinLnBrk="0" hangingPunct="1">
+              <a:lnSpc>
+                <a:spcPct val="100000"/>
+              </a:lnSpc>
+              <a:spcBef>
+                <a:spcPts val="0"/>
+              </a:spcBef>
+              <a:spcAft>
+                <a:spcPts val="0"/>
+              </a:spcAft>
+              <a:buClrTx/>
+              <a:buSzTx/>
+              <a:buFontTx/>
+              <a:buNone/>
+              <a:tabLst/>
+              <a:defRPr/>
+            </a:pPr>
             <a:endParaRPr lang="en-US" dirty="0"/>
           </a:p>
           <a:p>
-            <a:endParaRPr lang="en-US" dirty="0"/>
+            <a:pPr marL="0" marR="0" lvl="0" indent="0" algn="l" defTabSz="914400" rtl="0" eaLnBrk="1" fontAlgn="auto" latinLnBrk="0" hangingPunct="1">
+              <a:lnSpc>
+                <a:spcPct val="100000"/>
+              </a:lnSpc>
+              <a:spcBef>
+                <a:spcPts val="0"/>
+              </a:spcBef>
+              <a:spcAft>
+                <a:spcPts val="0"/>
+              </a:spcAft>
+              <a:buClrTx/>
+              <a:buSzTx/>
+              <a:buFontTx/>
+              <a:buNone/>
+              <a:tabLst/>
+              <a:defRPr/>
+            </a:pPr>
+            <a:r>
+              <a:rPr lang="en-US" dirty="0"/>
+              <a:t>Then after adding and clicking go, come back to the slide desk and go a couple of slides.</a:t>
+            </a:r>
           </a:p>
         </p:txBody>
       </p:sp>
@@ -8567,7 +8723,7 @@
           <a:p>
             <a:r>
               <a:rPr lang="en-US" dirty="0"/>
-              <a:t>https://docs.github.com/en/actions/using-jobs/using-jobs-in-a-workflow</a:t>
+              <a:t>URL-5: https://docs.github.com/en/actions/using-jobs/using-jobs-in-a-workflow</a:t>
             </a:r>
           </a:p>
           <a:p>
@@ -8727,7 +8883,7 @@
           <a:p>
             <a:r>
               <a:rPr lang="en-US" dirty="0"/>
-              <a:t>https://docs.github.com/en/actions/using-workflows/workflow-commands-for-github-actions</a:t>
+              <a:t>URL-6: https://docs.github.com/en/actions/using-workflows/workflow-commands-for-github-actions</a:t>
             </a:r>
           </a:p>
           <a:p>
@@ -8826,7 +8982,7 @@
           <a:p>
             <a:r>
               <a:rPr lang="en-US" dirty="0"/>
-              <a:t>https://docs.github.com/en/actions/examples/using-scripts-to-test-your-code-on-a-runner</a:t>
+              <a:t>URL-7: https://docs.github.com/en/actions/examples/using-scripts-to-test-your-code-on-a-runner</a:t>
             </a:r>
           </a:p>
         </p:txBody>
@@ -9215,7 +9371,7 @@
           <a:p>
             <a:fld id="{3CADBD16-5BFB-4D9F-9646-C75D1B53BBB6}" type="datetimeFigureOut">
               <a:rPr lang="en-US" smtClean="0"/>
-              <a:t>5/15/2023</a:t>
+              <a:t>5/16/2023</a:t>
             </a:fld>
             <a:endParaRPr lang="en-US"/>
           </a:p>
@@ -9456,7 +9612,7 @@
           <a:p>
             <a:fld id="{3CADBD16-5BFB-4D9F-9646-C75D1B53BBB6}" type="datetimeFigureOut">
               <a:rPr lang="en-US" smtClean="0"/>
-              <a:t>5/15/2023</a:t>
+              <a:t>5/16/2023</a:t>
             </a:fld>
             <a:endParaRPr lang="en-US"/>
           </a:p>
@@ -9664,7 +9820,7 @@
           <a:p>
             <a:fld id="{3CADBD16-5BFB-4D9F-9646-C75D1B53BBB6}" type="datetimeFigureOut">
               <a:rPr lang="en-US" smtClean="0"/>
-              <a:t>5/15/2023</a:t>
+              <a:t>5/16/2023</a:t>
             </a:fld>
             <a:endParaRPr lang="en-US"/>
           </a:p>
@@ -9862,7 +10018,7 @@
           <a:p>
             <a:fld id="{3CADBD16-5BFB-4D9F-9646-C75D1B53BBB6}" type="datetimeFigureOut">
               <a:rPr lang="en-US" smtClean="0"/>
-              <a:t>5/15/2023</a:t>
+              <a:t>5/16/2023</a:t>
             </a:fld>
             <a:endParaRPr lang="en-US"/>
           </a:p>
@@ -10139,7 +10295,7 @@
           <a:p>
             <a:fld id="{3CADBD16-5BFB-4D9F-9646-C75D1B53BBB6}" type="datetimeFigureOut">
               <a:rPr lang="en-US" smtClean="0"/>
-              <a:t>5/15/2023</a:t>
+              <a:t>5/16/2023</a:t>
             </a:fld>
             <a:endParaRPr lang="en-US"/>
           </a:p>
@@ -10404,7 +10560,7 @@
           <a:p>
             <a:fld id="{3CADBD16-5BFB-4D9F-9646-C75D1B53BBB6}" type="datetimeFigureOut">
               <a:rPr lang="en-US" smtClean="0"/>
-              <a:t>5/15/2023</a:t>
+              <a:t>5/16/2023</a:t>
             </a:fld>
             <a:endParaRPr lang="en-US"/>
           </a:p>
@@ -10820,7 +10976,7 @@
           <a:p>
             <a:fld id="{3CADBD16-5BFB-4D9F-9646-C75D1B53BBB6}" type="datetimeFigureOut">
               <a:rPr lang="en-US" smtClean="0"/>
-              <a:t>5/15/2023</a:t>
+              <a:t>5/16/2023</a:t>
             </a:fld>
             <a:endParaRPr lang="en-US"/>
           </a:p>
@@ -10970,7 +11126,7 @@
           <a:p>
             <a:fld id="{3CADBD16-5BFB-4D9F-9646-C75D1B53BBB6}" type="datetimeFigureOut">
               <a:rPr lang="en-US" smtClean="0"/>
-              <a:t>5/15/2023</a:t>
+              <a:t>5/16/2023</a:t>
             </a:fld>
             <a:endParaRPr lang="en-US"/>
           </a:p>
@@ -11083,7 +11239,7 @@
           <a:p>
             <a:fld id="{3CADBD16-5BFB-4D9F-9646-C75D1B53BBB6}" type="datetimeFigureOut">
               <a:rPr lang="en-US" smtClean="0"/>
-              <a:t>5/15/2023</a:t>
+              <a:t>5/16/2023</a:t>
             </a:fld>
             <a:endParaRPr lang="en-US"/>
           </a:p>
@@ -11399,7 +11555,7 @@
           <a:p>
             <a:fld id="{3CADBD16-5BFB-4D9F-9646-C75D1B53BBB6}" type="datetimeFigureOut">
               <a:rPr lang="en-US" smtClean="0"/>
-              <a:t>5/15/2023</a:t>
+              <a:t>5/16/2023</a:t>
             </a:fld>
             <a:endParaRPr lang="en-US"/>
           </a:p>
@@ -11650,7 +11806,7 @@
           <a:p>
             <a:fld id="{3CADBD16-5BFB-4D9F-9646-C75D1B53BBB6}" type="datetimeFigureOut">
               <a:rPr lang="en-US" smtClean="0"/>
-              <a:t>5/15/2023</a:t>
+              <a:t>5/16/2023</a:t>
             </a:fld>
             <a:endParaRPr lang="en-US"/>
           </a:p>
@@ -12159,7 +12315,7 @@
             <a:fld id="{3CADBD16-5BFB-4D9F-9646-C75D1B53BBB6}" type="datetimeFigureOut">
               <a:rPr lang="en-US" smtClean="0"/>
               <a:pPr/>
-              <a:t>5/15/2023</a:t>
+              <a:t>5/16/2023</a:t>
             </a:fld>
             <a:endParaRPr lang="en-US" dirty="0"/>
           </a:p>
@@ -12675,7 +12831,7 @@
         </p:nvSpPr>
         <p:spPr>
           <a:xfrm>
-            <a:off x="1143001" y="1181101"/>
+            <a:off x="947469" y="554248"/>
             <a:ext cx="4953000" cy="2481974"/>
           </a:xfrm>
         </p:spPr>
@@ -12691,7 +12847,7 @@
               </a:lnSpc>
             </a:pPr>
             <a:r>
-              <a:rPr lang="en-US" sz="4100"/>
+              <a:rPr lang="en-US" sz="4100" dirty="0"/>
               <a:t>Getting Started with GitHub Actions</a:t>
             </a:r>
           </a:p>
@@ -12715,7 +12871,7 @@
         </p:nvSpPr>
         <p:spPr>
           <a:xfrm>
-            <a:off x="444501" y="3537956"/>
+            <a:off x="279901" y="3135390"/>
             <a:ext cx="4521200" cy="2037344"/>
           </a:xfrm>
         </p:spPr>
@@ -12749,10 +12905,8 @@
             <a:pPr algn="l"/>
             <a:r>
               <a:rPr lang="en-US" sz="1800" dirty="0"/>
-              <a:t>https://bit.ly/hobby-helps-profession</a:t>
-            </a:r>
-          </a:p>
-          <a:p>
+              <a:t>https://bit.ly/github-actions-getting-started</a:t>
+            </a:r>
             <a:endParaRPr lang="en-US" dirty="0"/>
           </a:p>
         </p:txBody>
@@ -17612,7 +17766,7 @@
             </a:r>
             <a:r>
               <a:rPr lang="en-US" dirty="0">
-                <a:hlinkClick r:id="rId2"/>
+                <a:hlinkClick r:id="rId3"/>
               </a:rPr>
               <a:t>GitHub Actions Documentation - GitHub Docs</a:t>
             </a:r>
@@ -17647,7 +17801,7 @@
           <p:nvPr/>
         </p:nvPicPr>
         <p:blipFill rotWithShape="1">
-          <a:blip r:embed="rId3"/>
+          <a:blip r:embed="rId4"/>
           <a:srcRect l="19734" r="19628" b="1"/>
           <a:stretch/>
         </p:blipFill>

</xml_diff>